<commit_message>
team Q&A slide added
</commit_message>
<xml_diff>
--- a/documents/Zumi7337 team presentation.pptx
+++ b/documents/Zumi7337 team presentation.pptx
@@ -5,15 +5,17 @@
     <p:sldMasterId id="2147483657" r:id="rId4"/>
   </p:sldMasterIdLst>
   <p:notesMasterIdLst>
-    <p:notesMasterId r:id="rId8"/>
+    <p:notesMasterId r:id="rId10"/>
   </p:notesMasterIdLst>
   <p:handoutMasterIdLst>
-    <p:handoutMasterId r:id="rId9"/>
+    <p:handoutMasterId r:id="rId11"/>
   </p:handoutMasterIdLst>
   <p:sldIdLst>
     <p:sldId id="298" r:id="rId5"/>
     <p:sldId id="299" r:id="rId6"/>
-    <p:sldId id="292" r:id="rId7"/>
+    <p:sldId id="301" r:id="rId7"/>
+    <p:sldId id="300" r:id="rId8"/>
+    <p:sldId id="292" r:id="rId9"/>
   </p:sldIdLst>
   <p:sldSz cx="12192000" cy="6858000"/>
   <p:notesSz cx="6858000" cy="9144000"/>
@@ -7100,6 +7102,342 @@
           <p:cNvPr id="2" name="Titel 1">
             <a:extLst>
               <a:ext uri="{FF2B5EF4-FFF2-40B4-BE49-F238E27FC236}">
+                <a16:creationId xmlns:a16="http://schemas.microsoft.com/office/drawing/2014/main" id="{55465607-5B7E-BA7E-5963-9E15BA7D03E2}"/>
+              </a:ext>
+            </a:extLst>
+          </p:cNvPr>
+          <p:cNvSpPr>
+            <a:spLocks noGrp="1"/>
+          </p:cNvSpPr>
+          <p:nvPr>
+            <p:ph type="title"/>
+          </p:nvPr>
+        </p:nvSpPr>
+        <p:spPr/>
+        <p:txBody>
+          <a:bodyPr/>
+          <a:lstStyle/>
+          <a:p>
+            <a:endParaRPr lang="de-CH"/>
+          </a:p>
+        </p:txBody>
+      </p:sp>
+      <p:sp>
+        <p:nvSpPr>
+          <p:cNvPr id="3" name="Inhaltsplatzhalter 2">
+            <a:extLst>
+              <a:ext uri="{FF2B5EF4-FFF2-40B4-BE49-F238E27FC236}">
+                <a16:creationId xmlns:a16="http://schemas.microsoft.com/office/drawing/2014/main" id="{B28AB23A-4B47-42DE-419B-795318B780F0}"/>
+              </a:ext>
+            </a:extLst>
+          </p:cNvPr>
+          <p:cNvSpPr>
+            <a:spLocks noGrp="1"/>
+          </p:cNvSpPr>
+          <p:nvPr>
+            <p:ph idx="1"/>
+          </p:nvPr>
+        </p:nvSpPr>
+        <p:spPr/>
+        <p:txBody>
+          <a:bodyPr/>
+          <a:lstStyle/>
+          <a:p>
+            <a:endParaRPr lang="de-CH"/>
+          </a:p>
+        </p:txBody>
+      </p:sp>
+      <p:sp>
+        <p:nvSpPr>
+          <p:cNvPr id="4" name="Datumsplatzhalter 3">
+            <a:extLst>
+              <a:ext uri="{FF2B5EF4-FFF2-40B4-BE49-F238E27FC236}">
+                <a16:creationId xmlns:a16="http://schemas.microsoft.com/office/drawing/2014/main" id="{31ED8218-E6E4-AD92-7D21-5CDAF7BA86E1}"/>
+              </a:ext>
+            </a:extLst>
+          </p:cNvPr>
+          <p:cNvSpPr>
+            <a:spLocks noGrp="1"/>
+          </p:cNvSpPr>
+          <p:nvPr>
+            <p:ph type="dt" sz="half" idx="10"/>
+          </p:nvPr>
+        </p:nvSpPr>
+        <p:spPr/>
+        <p:txBody>
+          <a:bodyPr/>
+          <a:lstStyle/>
+          <a:p>
+            <a:r>
+              <a:rPr lang="de-DE"/>
+              <a:t>23 June 2025</a:t>
+            </a:r>
+            <a:endParaRPr lang="de-CH" dirty="0"/>
+          </a:p>
+        </p:txBody>
+      </p:sp>
+      <p:sp>
+        <p:nvSpPr>
+          <p:cNvPr id="5" name="Fußzeilenplatzhalter 4">
+            <a:extLst>
+              <a:ext uri="{FF2B5EF4-FFF2-40B4-BE49-F238E27FC236}">
+                <a16:creationId xmlns:a16="http://schemas.microsoft.com/office/drawing/2014/main" id="{1E5446FC-9F59-60FD-1F09-17F042D07420}"/>
+              </a:ext>
+            </a:extLst>
+          </p:cNvPr>
+          <p:cNvSpPr>
+            <a:spLocks noGrp="1"/>
+          </p:cNvSpPr>
+          <p:nvPr>
+            <p:ph type="ftr" sz="quarter" idx="11"/>
+          </p:nvPr>
+        </p:nvSpPr>
+        <p:spPr/>
+        <p:txBody>
+          <a:bodyPr/>
+          <a:lstStyle/>
+          <a:p>
+            <a:r>
+              <a:rPr lang="de-CH"/>
+              <a:t>Zumi7337 team presentation</a:t>
+            </a:r>
+            <a:endParaRPr lang="de-CH" dirty="0"/>
+          </a:p>
+        </p:txBody>
+      </p:sp>
+      <p:sp>
+        <p:nvSpPr>
+          <p:cNvPr id="6" name="Foliennummernplatzhalter 5">
+            <a:extLst>
+              <a:ext uri="{FF2B5EF4-FFF2-40B4-BE49-F238E27FC236}">
+                <a16:creationId xmlns:a16="http://schemas.microsoft.com/office/drawing/2014/main" id="{B34AC902-9351-0007-EA7D-3E7ECE3AC387}"/>
+              </a:ext>
+            </a:extLst>
+          </p:cNvPr>
+          <p:cNvSpPr>
+            <a:spLocks noGrp="1"/>
+          </p:cNvSpPr>
+          <p:nvPr>
+            <p:ph type="sldNum" sz="quarter" idx="12"/>
+          </p:nvPr>
+        </p:nvSpPr>
+        <p:spPr/>
+        <p:txBody>
+          <a:bodyPr/>
+          <a:lstStyle/>
+          <a:p>
+            <a:fld id="{442AD375-037F-43D0-B059-5172DA06796A}" type="slidenum">
+              <a:rPr lang="de-CH" smtClean="0"/>
+              <a:pPr/>
+              <a:t>3</a:t>
+            </a:fld>
+            <a:endParaRPr lang="de-CH" dirty="0"/>
+          </a:p>
+        </p:txBody>
+      </p:sp>
+    </p:spTree>
+    <p:extLst>
+      <p:ext uri="{BB962C8B-B14F-4D97-AF65-F5344CB8AC3E}">
+        <p14:creationId xmlns:p14="http://schemas.microsoft.com/office/powerpoint/2010/main" val="764336653"/>
+      </p:ext>
+    </p:extLst>
+  </p:cSld>
+  <p:clrMapOvr>
+    <a:masterClrMapping/>
+  </p:clrMapOvr>
+</p:sld>
+</file>
+
+<file path=ppt/slides/slide4.xml><?xml version="1.0" encoding="utf-8"?>
+<p:sld xmlns:a="http://schemas.openxmlformats.org/drawingml/2006/main" xmlns:r="http://schemas.openxmlformats.org/officeDocument/2006/relationships" xmlns:p="http://schemas.openxmlformats.org/presentationml/2006/main">
+  <p:cSld>
+    <p:spTree>
+      <p:nvGrpSpPr>
+        <p:cNvPr id="1" name=""/>
+        <p:cNvGrpSpPr/>
+        <p:nvPr/>
+      </p:nvGrpSpPr>
+      <p:grpSpPr>
+        <a:xfrm>
+          <a:off x="0" y="0"/>
+          <a:ext cx="0" cy="0"/>
+          <a:chOff x="0" y="0"/>
+          <a:chExt cx="0" cy="0"/>
+        </a:xfrm>
+      </p:grpSpPr>
+      <p:sp>
+        <p:nvSpPr>
+          <p:cNvPr id="2" name="Titel 1">
+            <a:extLst>
+              <a:ext uri="{FF2B5EF4-FFF2-40B4-BE49-F238E27FC236}">
+                <a16:creationId xmlns:a16="http://schemas.microsoft.com/office/drawing/2014/main" id="{E78E4B63-045C-92F9-EC51-D28E9F406E86}"/>
+              </a:ext>
+            </a:extLst>
+          </p:cNvPr>
+          <p:cNvSpPr>
+            <a:spLocks noGrp="1"/>
+          </p:cNvSpPr>
+          <p:nvPr>
+            <p:ph type="title"/>
+          </p:nvPr>
+        </p:nvSpPr>
+        <p:spPr/>
+        <p:txBody>
+          <a:bodyPr/>
+          <a:lstStyle/>
+          <a:p>
+            <a:endParaRPr lang="de-CH"/>
+          </a:p>
+        </p:txBody>
+      </p:sp>
+      <p:sp>
+        <p:nvSpPr>
+          <p:cNvPr id="3" name="Inhaltsplatzhalter 2">
+            <a:extLst>
+              <a:ext uri="{FF2B5EF4-FFF2-40B4-BE49-F238E27FC236}">
+                <a16:creationId xmlns:a16="http://schemas.microsoft.com/office/drawing/2014/main" id="{17D6F3C5-F021-B565-B1E2-31F9B9CB683F}"/>
+              </a:ext>
+            </a:extLst>
+          </p:cNvPr>
+          <p:cNvSpPr>
+            <a:spLocks noGrp="1"/>
+          </p:cNvSpPr>
+          <p:nvPr>
+            <p:ph idx="1"/>
+          </p:nvPr>
+        </p:nvSpPr>
+        <p:spPr/>
+        <p:txBody>
+          <a:bodyPr/>
+          <a:lstStyle/>
+          <a:p>
+            <a:endParaRPr lang="de-CH"/>
+          </a:p>
+        </p:txBody>
+      </p:sp>
+      <p:sp>
+        <p:nvSpPr>
+          <p:cNvPr id="4" name="Datumsplatzhalter 3">
+            <a:extLst>
+              <a:ext uri="{FF2B5EF4-FFF2-40B4-BE49-F238E27FC236}">
+                <a16:creationId xmlns:a16="http://schemas.microsoft.com/office/drawing/2014/main" id="{BDE885EB-96C4-037D-53F9-DCB09363A8A5}"/>
+              </a:ext>
+            </a:extLst>
+          </p:cNvPr>
+          <p:cNvSpPr>
+            <a:spLocks noGrp="1"/>
+          </p:cNvSpPr>
+          <p:nvPr>
+            <p:ph type="dt" sz="half" idx="10"/>
+          </p:nvPr>
+        </p:nvSpPr>
+        <p:spPr/>
+        <p:txBody>
+          <a:bodyPr/>
+          <a:lstStyle/>
+          <a:p>
+            <a:r>
+              <a:rPr lang="de-DE"/>
+              <a:t>23 June 2025</a:t>
+            </a:r>
+            <a:endParaRPr lang="de-CH" dirty="0"/>
+          </a:p>
+        </p:txBody>
+      </p:sp>
+      <p:sp>
+        <p:nvSpPr>
+          <p:cNvPr id="5" name="Fußzeilenplatzhalter 4">
+            <a:extLst>
+              <a:ext uri="{FF2B5EF4-FFF2-40B4-BE49-F238E27FC236}">
+                <a16:creationId xmlns:a16="http://schemas.microsoft.com/office/drawing/2014/main" id="{075EEEA5-2949-F417-0282-7532BF2A3710}"/>
+              </a:ext>
+            </a:extLst>
+          </p:cNvPr>
+          <p:cNvSpPr>
+            <a:spLocks noGrp="1"/>
+          </p:cNvSpPr>
+          <p:nvPr>
+            <p:ph type="ftr" sz="quarter" idx="11"/>
+          </p:nvPr>
+        </p:nvSpPr>
+        <p:spPr/>
+        <p:txBody>
+          <a:bodyPr/>
+          <a:lstStyle/>
+          <a:p>
+            <a:r>
+              <a:rPr lang="de-CH"/>
+              <a:t>Zumi7337 team presentation</a:t>
+            </a:r>
+            <a:endParaRPr lang="de-CH" dirty="0"/>
+          </a:p>
+        </p:txBody>
+      </p:sp>
+      <p:sp>
+        <p:nvSpPr>
+          <p:cNvPr id="6" name="Foliennummernplatzhalter 5">
+            <a:extLst>
+              <a:ext uri="{FF2B5EF4-FFF2-40B4-BE49-F238E27FC236}">
+                <a16:creationId xmlns:a16="http://schemas.microsoft.com/office/drawing/2014/main" id="{82317C62-13EB-0858-FF90-1FFA1931EF06}"/>
+              </a:ext>
+            </a:extLst>
+          </p:cNvPr>
+          <p:cNvSpPr>
+            <a:spLocks noGrp="1"/>
+          </p:cNvSpPr>
+          <p:nvPr>
+            <p:ph type="sldNum" sz="quarter" idx="12"/>
+          </p:nvPr>
+        </p:nvSpPr>
+        <p:spPr/>
+        <p:txBody>
+          <a:bodyPr/>
+          <a:lstStyle/>
+          <a:p>
+            <a:fld id="{442AD375-037F-43D0-B059-5172DA06796A}" type="slidenum">
+              <a:rPr lang="de-CH" smtClean="0"/>
+              <a:pPr/>
+              <a:t>4</a:t>
+            </a:fld>
+            <a:endParaRPr lang="de-CH" dirty="0"/>
+          </a:p>
+        </p:txBody>
+      </p:sp>
+    </p:spTree>
+    <p:extLst>
+      <p:ext uri="{BB962C8B-B14F-4D97-AF65-F5344CB8AC3E}">
+        <p14:creationId xmlns:p14="http://schemas.microsoft.com/office/powerpoint/2010/main" val="1094990082"/>
+      </p:ext>
+    </p:extLst>
+  </p:cSld>
+  <p:clrMapOvr>
+    <a:masterClrMapping/>
+  </p:clrMapOvr>
+</p:sld>
+</file>
+
+<file path=ppt/slides/slide5.xml><?xml version="1.0" encoding="utf-8"?>
+<p:sld xmlns:a="http://schemas.openxmlformats.org/drawingml/2006/main" xmlns:r="http://schemas.openxmlformats.org/officeDocument/2006/relationships" xmlns:p="http://schemas.openxmlformats.org/presentationml/2006/main">
+  <p:cSld>
+    <p:spTree>
+      <p:nvGrpSpPr>
+        <p:cNvPr id="1" name=""/>
+        <p:cNvGrpSpPr/>
+        <p:nvPr/>
+      </p:nvGrpSpPr>
+      <p:grpSpPr>
+        <a:xfrm>
+          <a:off x="0" y="0"/>
+          <a:ext cx="0" cy="0"/>
+          <a:chOff x="0" y="0"/>
+          <a:chExt cx="0" cy="0"/>
+        </a:xfrm>
+      </p:grpSpPr>
+      <p:sp>
+        <p:nvSpPr>
+          <p:cNvPr id="2" name="Titel 1">
+            <a:extLst>
+              <a:ext uri="{FF2B5EF4-FFF2-40B4-BE49-F238E27FC236}">
                 <a16:creationId xmlns:a16="http://schemas.microsoft.com/office/drawing/2014/main" id="{6E301FFD-0542-B6DE-2815-2259422C69E5}"/>
               </a:ext>
             </a:extLst>
@@ -7111,40 +7449,63 @@
             <p:ph type="title"/>
           </p:nvPr>
         </p:nvSpPr>
-        <p:spPr/>
-        <p:txBody>
-          <a:bodyPr/>
+        <p:spPr>
+          <a:xfrm>
+            <a:off x="408076" y="1170372"/>
+            <a:ext cx="11012400" cy="492443"/>
+          </a:xfrm>
+        </p:spPr>
+        <p:txBody>
+          <a:bodyPr wrap="square" anchor="t">
+            <a:normAutofit/>
+          </a:bodyPr>
           <a:lstStyle/>
           <a:p>
-            <a:endParaRPr lang="de-CH"/>
-          </a:p>
-        </p:txBody>
-      </p:sp>
-      <p:sp>
-        <p:nvSpPr>
-          <p:cNvPr id="3" name="Inhaltsplatzhalter 2">
+            <a:r>
+              <a:rPr lang="de-CH" dirty="0"/>
+              <a:t>Team Q&amp;A</a:t>
+            </a:r>
+          </a:p>
+        </p:txBody>
+      </p:sp>
+      <p:pic>
+        <p:nvPicPr>
+          <p:cNvPr id="11" name="Grafik 10" descr="Vier Personen im Vierer-Ruderboot">
             <a:extLst>
               <a:ext uri="{FF2B5EF4-FFF2-40B4-BE49-F238E27FC236}">
-                <a16:creationId xmlns:a16="http://schemas.microsoft.com/office/drawing/2014/main" id="{F9CBAB51-05BC-A82E-6967-521234083EB6}"/>
+                <a16:creationId xmlns:a16="http://schemas.microsoft.com/office/drawing/2014/main" id="{CD4420C4-F72A-3564-A822-C5B6D94B2F64}"/>
               </a:ext>
             </a:extLst>
           </p:cNvPr>
-          <p:cNvSpPr>
-            <a:spLocks noGrp="1"/>
-          </p:cNvSpPr>
-          <p:nvPr>
-            <p:ph idx="1"/>
-          </p:nvPr>
-        </p:nvSpPr>
-        <p:spPr/>
-        <p:txBody>
-          <a:bodyPr/>
-          <a:lstStyle/>
-          <a:p>
-            <a:endParaRPr lang="de-CH" dirty="0"/>
-          </a:p>
-        </p:txBody>
-      </p:sp>
+          <p:cNvPicPr>
+            <a:picLocks noChangeAspect="1"/>
+          </p:cNvPicPr>
+          <p:nvPr/>
+        </p:nvPicPr>
+        <p:blipFill>
+          <a:blip r:embed="rId2" cstate="print">
+            <a:extLst>
+              <a:ext uri="{28A0092B-C50C-407E-A947-70E740481C1C}">
+                <a14:useLocalDpi xmlns:a14="http://schemas.microsoft.com/office/drawing/2010/main" val="0"/>
+              </a:ext>
+            </a:extLst>
+          </a:blip>
+          <a:srcRect t="19029" b="23748"/>
+          <a:stretch>
+            <a:fillRect/>
+          </a:stretch>
+        </p:blipFill>
+        <p:spPr>
+          <a:xfrm>
+            <a:off x="408075" y="1989138"/>
+            <a:ext cx="11013193" cy="4175125"/>
+          </a:xfrm>
+          <a:prstGeom prst="rect">
+            <a:avLst/>
+          </a:prstGeom>
+          <a:noFill/>
+        </p:spPr>
+      </p:pic>
       <p:sp>
         <p:nvSpPr>
           <p:cNvPr id="4" name="Datumsplatzhalter 3">
@@ -7161,16 +7522,31 @@
             <p:ph type="dt" sz="half" idx="10"/>
           </p:nvPr>
         </p:nvSpPr>
-        <p:spPr/>
-        <p:txBody>
-          <a:bodyPr/>
+        <p:spPr>
+          <a:xfrm>
+            <a:off x="419100" y="6620400"/>
+            <a:ext cx="1188000" cy="144016"/>
+          </a:xfrm>
+        </p:spPr>
+        <p:txBody>
+          <a:bodyPr anchor="t">
+            <a:normAutofit/>
+          </a:bodyPr>
           <a:lstStyle/>
           <a:p>
+            <a:pPr>
+              <a:lnSpc>
+                <a:spcPct val="90000"/>
+              </a:lnSpc>
+              <a:spcAft>
+                <a:spcPts val="600"/>
+              </a:spcAft>
+            </a:pPr>
             <a:r>
               <a:rPr lang="de-DE"/>
               <a:t>23 June 2025</a:t>
             </a:r>
-            <a:endParaRPr lang="de-CH" dirty="0"/>
+            <a:endParaRPr lang="de-CH"/>
           </a:p>
         </p:txBody>
       </p:sp>
@@ -7190,16 +7566,30 @@
             <p:ph type="ftr" sz="quarter" idx="11"/>
           </p:nvPr>
         </p:nvSpPr>
-        <p:spPr/>
-        <p:txBody>
-          <a:bodyPr/>
+        <p:spPr>
+          <a:xfrm>
+            <a:off x="1667508" y="6620400"/>
+            <a:ext cx="8100000" cy="144016"/>
+          </a:xfrm>
+        </p:spPr>
+        <p:txBody>
+          <a:bodyPr anchor="t">
+            <a:normAutofit/>
+          </a:bodyPr>
           <a:lstStyle/>
           <a:p>
+            <a:pPr>
+              <a:lnSpc>
+                <a:spcPct val="90000"/>
+              </a:lnSpc>
+              <a:spcAft>
+                <a:spcPts val="600"/>
+              </a:spcAft>
+            </a:pPr>
             <a:r>
               <a:rPr lang="de-CH"/>
               <a:t>Zumi7337 team presentation</a:t>
             </a:r>
-            <a:endParaRPr lang="de-CH" dirty="0"/>
           </a:p>
         </p:txBody>
       </p:sp>
@@ -7219,17 +7609,39 @@
             <p:ph type="sldNum" sz="quarter" idx="12"/>
           </p:nvPr>
         </p:nvSpPr>
-        <p:spPr/>
-        <p:txBody>
-          <a:bodyPr/>
+        <p:spPr>
+          <a:xfrm>
+            <a:off x="11460596" y="6620400"/>
+            <a:ext cx="376710" cy="144016"/>
+          </a:xfrm>
+        </p:spPr>
+        <p:txBody>
+          <a:bodyPr anchor="t">
+            <a:normAutofit/>
+          </a:bodyPr>
           <a:lstStyle/>
           <a:p>
+            <a:pPr>
+              <a:lnSpc>
+                <a:spcPct val="90000"/>
+              </a:lnSpc>
+              <a:spcAft>
+                <a:spcPts val="600"/>
+              </a:spcAft>
+            </a:pPr>
             <a:fld id="{442AD375-037F-43D0-B059-5172DA06796A}" type="slidenum">
               <a:rPr lang="de-CH" smtClean="0"/>
-              <a:pPr/>
-              <a:t>3</a:t>
+              <a:pPr>
+                <a:lnSpc>
+                  <a:spcPct val="90000"/>
+                </a:lnSpc>
+                <a:spcAft>
+                  <a:spcPts val="600"/>
+                </a:spcAft>
+              </a:pPr>
+              <a:t>5</a:t>
             </a:fld>
-            <a:endParaRPr lang="de-CH" dirty="0"/>
+            <a:endParaRPr lang="de-CH"/>
           </a:p>
         </p:txBody>
       </p:sp>
@@ -8101,7 +8513,7 @@
   <wetp:taskpane dockstate="right" visibility="0" width="613" row="1">
     <wetp:webextensionref xmlns:r="http://schemas.openxmlformats.org/officeDocument/2006/relationships" r:id="rId2"/>
   </wetp:taskpane>
-  <wetp:taskpane dockstate="right" visibility="0" width="613" row="3">
+  <wetp:taskpane dockstate="right" visibility="0" width="613" row="2">
     <wetp:webextensionref xmlns:r="http://schemas.openxmlformats.org/officeDocument/2006/relationships" r:id="rId3"/>
   </wetp:taskpane>
 </wetp:taskpanes>
@@ -8146,9 +8558,12 @@
 </file>
 
 <file path=customXml/item1.xml><?xml version="1.0" encoding="utf-8"?>
-<p:properties xmlns:p="http://schemas.microsoft.com/office/2006/metadata/properties" xmlns:xsi="http://www.w3.org/2001/XMLSchema-instance" xmlns:pc="http://schemas.microsoft.com/office/infopath/2007/PartnerControls">
-  <documentManagement/>
-</p:properties>
+<?mso-contentType ?>
+<FormTemplates xmlns="http://schemas.microsoft.com/sharepoint/v3/contenttype/forms">
+  <Display>DocumentLibraryForm</Display>
+  <Edit>DocumentLibraryForm</Edit>
+  <New>DocumentLibraryForm</New>
+</FormTemplates>
 </file>
 
 <file path=customXml/item2.xml><?xml version="1.0" encoding="utf-8"?>
@@ -8296,27 +8711,15 @@
 </file>
 
 <file path=customXml/item3.xml><?xml version="1.0" encoding="utf-8"?>
-<?mso-contentType ?>
-<FormTemplates xmlns="http://schemas.microsoft.com/sharepoint/v3/contenttype/forms">
-  <Display>DocumentLibraryForm</Display>
-  <Edit>DocumentLibraryForm</Edit>
-  <New>DocumentLibraryForm</New>
-</FormTemplates>
+<p:properties xmlns:p="http://schemas.microsoft.com/office/2006/metadata/properties" xmlns:xsi="http://www.w3.org/2001/XMLSchema-instance" xmlns:pc="http://schemas.microsoft.com/office/infopath/2007/PartnerControls">
+  <documentManagement/>
+</p:properties>
 </file>
 
 <file path=customXml/itemProps1.xml><?xml version="1.0" encoding="utf-8"?>
-<ds:datastoreItem xmlns:ds="http://schemas.openxmlformats.org/officeDocument/2006/customXml" ds:itemID="{5626B806-0237-4942-A1FD-5C97285908C2}">
+<ds:datastoreItem xmlns:ds="http://schemas.openxmlformats.org/officeDocument/2006/customXml" ds:itemID="{4B6B7BE2-63AD-4C37-AC44-F0E4FC348E24}">
   <ds:schemaRefs>
-    <ds:schemaRef ds:uri="http://purl.org/dc/dcmitype/"/>
-    <ds:schemaRef ds:uri="http://schemas.openxmlformats.org/package/2006/metadata/core-properties"/>
-    <ds:schemaRef ds:uri="http://purl.org/dc/elements/1.1/"/>
-    <ds:schemaRef ds:uri="http://schemas.microsoft.com/office/2006/metadata/properties"/>
-    <ds:schemaRef ds:uri="c9077d15-72ed-4fec-bcfe-3472729e9195"/>
-    <ds:schemaRef ds:uri="http://schemas.microsoft.com/office/2006/documentManagement/types"/>
-    <ds:schemaRef ds:uri="http://purl.org/dc/terms/"/>
-    <ds:schemaRef ds:uri="http://schemas.microsoft.com/office/infopath/2007/PartnerControls"/>
-    <ds:schemaRef ds:uri="bc24777f-78b6-4f3c-a73a-d5fa08e4d537"/>
-    <ds:schemaRef ds:uri="http://www.w3.org/XML/1998/namespace"/>
+    <ds:schemaRef ds:uri="http://schemas.microsoft.com/sharepoint/v3/contenttype/forms"/>
   </ds:schemaRefs>
 </ds:datastoreItem>
 </file>
@@ -8340,9 +8743,18 @@
 </file>
 
 <file path=customXml/itemProps3.xml><?xml version="1.0" encoding="utf-8"?>
-<ds:datastoreItem xmlns:ds="http://schemas.openxmlformats.org/officeDocument/2006/customXml" ds:itemID="{4B6B7BE2-63AD-4C37-AC44-F0E4FC348E24}">
+<ds:datastoreItem xmlns:ds="http://schemas.openxmlformats.org/officeDocument/2006/customXml" ds:itemID="{5626B806-0237-4942-A1FD-5C97285908C2}">
   <ds:schemaRefs>
-    <ds:schemaRef ds:uri="http://schemas.microsoft.com/sharepoint/v3/contenttype/forms"/>
+    <ds:schemaRef ds:uri="http://purl.org/dc/dcmitype/"/>
+    <ds:schemaRef ds:uri="http://schemas.openxmlformats.org/package/2006/metadata/core-properties"/>
+    <ds:schemaRef ds:uri="http://purl.org/dc/elements/1.1/"/>
+    <ds:schemaRef ds:uri="http://schemas.microsoft.com/office/2006/metadata/properties"/>
+    <ds:schemaRef ds:uri="c9077d15-72ed-4fec-bcfe-3472729e9195"/>
+    <ds:schemaRef ds:uri="http://schemas.microsoft.com/office/2006/documentManagement/types"/>
+    <ds:schemaRef ds:uri="http://purl.org/dc/terms/"/>
+    <ds:schemaRef ds:uri="http://schemas.microsoft.com/office/infopath/2007/PartnerControls"/>
+    <ds:schemaRef ds:uri="bc24777f-78b6-4f3c-a73a-d5fa08e4d537"/>
+    <ds:schemaRef ds:uri="http://www.w3.org/XML/1998/namespace"/>
   </ds:schemaRefs>
 </ds:datastoreItem>
 </file>
</xml_diff>

<commit_message>
slide lessons learned added
</commit_message>
<xml_diff>
--- a/documents/Zumi7337 team presentation.pptx
+++ b/documents/Zumi7337 team presentation.pptx
@@ -839,6 +839,925 @@
     <dgm:fillClrLst meth="repeat">
       <a:schemeClr val="accent2">
         <a:tint val="60000"/>
+      </a:schemeClr>
+    </dgm:fillClrLst>
+    <dgm:linClrLst meth="repeat">
+      <a:schemeClr val="lt1"/>
+    </dgm:linClrLst>
+    <dgm:effectClrLst/>
+    <dgm:txLinClrLst/>
+    <dgm:txFillClrLst meth="repeat">
+      <a:schemeClr val="dk1"/>
+    </dgm:txFillClrLst>
+    <dgm:txEffectClrLst/>
+  </dgm:styleLbl>
+  <dgm:styleLbl name="revTx">
+    <dgm:fillClrLst meth="repeat">
+      <a:schemeClr val="lt1">
+        <a:alpha val="0"/>
+      </a:schemeClr>
+    </dgm:fillClrLst>
+    <dgm:linClrLst meth="repeat">
+      <a:schemeClr val="dk1">
+        <a:alpha val="0"/>
+      </a:schemeClr>
+    </dgm:linClrLst>
+    <dgm:effectClrLst/>
+    <dgm:txLinClrLst/>
+    <dgm:txFillClrLst meth="repeat">
+      <a:schemeClr val="tx1"/>
+    </dgm:txFillClrLst>
+    <dgm:txEffectClrLst/>
+  </dgm:styleLbl>
+</dgm:colorsDef>
+</file>
+
+<file path=ppt/diagrams/colors2.xml><?xml version="1.0" encoding="utf-8"?>
+<dgm:colorsDef xmlns:dgm="http://schemas.openxmlformats.org/drawingml/2006/diagram" xmlns:a="http://schemas.openxmlformats.org/drawingml/2006/main" uniqueId="urn:microsoft.com/office/officeart/2005/8/colors/colorful1">
+  <dgm:title val=""/>
+  <dgm:desc val=""/>
+  <dgm:catLst>
+    <dgm:cat type="colorful" pri="10100"/>
+  </dgm:catLst>
+  <dgm:styleLbl name="node0">
+    <dgm:fillClrLst meth="repeat">
+      <a:schemeClr val="accent1"/>
+    </dgm:fillClrLst>
+    <dgm:linClrLst meth="repeat">
+      <a:schemeClr val="lt1"/>
+    </dgm:linClrLst>
+    <dgm:effectClrLst/>
+    <dgm:txLinClrLst/>
+    <dgm:txFillClrLst/>
+    <dgm:txEffectClrLst/>
+  </dgm:styleLbl>
+  <dgm:styleLbl name="node1">
+    <dgm:fillClrLst meth="repeat">
+      <a:schemeClr val="accent2"/>
+      <a:schemeClr val="accent3"/>
+      <a:schemeClr val="accent4"/>
+      <a:schemeClr val="accent5"/>
+      <a:schemeClr val="accent6"/>
+    </dgm:fillClrLst>
+    <dgm:linClrLst meth="repeat">
+      <a:schemeClr val="lt1"/>
+    </dgm:linClrLst>
+    <dgm:effectClrLst/>
+    <dgm:txLinClrLst/>
+    <dgm:txFillClrLst/>
+    <dgm:txEffectClrLst/>
+  </dgm:styleLbl>
+  <dgm:styleLbl name="alignNode1">
+    <dgm:fillClrLst meth="repeat">
+      <a:schemeClr val="accent2"/>
+      <a:schemeClr val="accent3"/>
+      <a:schemeClr val="accent4"/>
+      <a:schemeClr val="accent5"/>
+      <a:schemeClr val="accent6"/>
+    </dgm:fillClrLst>
+    <dgm:linClrLst meth="repeat">
+      <a:schemeClr val="accent2"/>
+      <a:schemeClr val="accent3"/>
+      <a:schemeClr val="accent4"/>
+      <a:schemeClr val="accent5"/>
+      <a:schemeClr val="accent6"/>
+    </dgm:linClrLst>
+    <dgm:effectClrLst/>
+    <dgm:txLinClrLst/>
+    <dgm:txFillClrLst/>
+    <dgm:txEffectClrLst/>
+  </dgm:styleLbl>
+  <dgm:styleLbl name="lnNode1">
+    <dgm:fillClrLst meth="repeat">
+      <a:schemeClr val="accent2"/>
+      <a:schemeClr val="accent3"/>
+      <a:schemeClr val="accent4"/>
+      <a:schemeClr val="accent5"/>
+      <a:schemeClr val="accent6"/>
+    </dgm:fillClrLst>
+    <dgm:linClrLst meth="repeat">
+      <a:schemeClr val="lt1"/>
+    </dgm:linClrLst>
+    <dgm:effectClrLst/>
+    <dgm:txLinClrLst/>
+    <dgm:txFillClrLst/>
+    <dgm:txEffectClrLst/>
+  </dgm:styleLbl>
+  <dgm:styleLbl name="vennNode1">
+    <dgm:fillClrLst meth="repeat">
+      <a:schemeClr val="accent2">
+        <a:alpha val="50000"/>
+      </a:schemeClr>
+      <a:schemeClr val="accent3">
+        <a:alpha val="50000"/>
+      </a:schemeClr>
+      <a:schemeClr val="accent4">
+        <a:alpha val="50000"/>
+      </a:schemeClr>
+      <a:schemeClr val="accent5">
+        <a:alpha val="50000"/>
+      </a:schemeClr>
+      <a:schemeClr val="accent6">
+        <a:alpha val="50000"/>
+      </a:schemeClr>
+    </dgm:fillClrLst>
+    <dgm:linClrLst meth="repeat">
+      <a:schemeClr val="lt1"/>
+    </dgm:linClrLst>
+    <dgm:effectClrLst/>
+    <dgm:txLinClrLst/>
+    <dgm:txFillClrLst/>
+    <dgm:txEffectClrLst/>
+  </dgm:styleLbl>
+  <dgm:styleLbl name="node2">
+    <dgm:fillClrLst>
+      <a:schemeClr val="accent2"/>
+    </dgm:fillClrLst>
+    <dgm:linClrLst meth="repeat">
+      <a:schemeClr val="lt1"/>
+    </dgm:linClrLst>
+    <dgm:effectClrLst/>
+    <dgm:txLinClrLst/>
+    <dgm:txFillClrLst/>
+    <dgm:txEffectClrLst/>
+  </dgm:styleLbl>
+  <dgm:styleLbl name="node3">
+    <dgm:fillClrLst>
+      <a:schemeClr val="accent3"/>
+    </dgm:fillClrLst>
+    <dgm:linClrLst meth="repeat">
+      <a:schemeClr val="lt1"/>
+    </dgm:linClrLst>
+    <dgm:effectClrLst/>
+    <dgm:txLinClrLst/>
+    <dgm:txFillClrLst/>
+    <dgm:txEffectClrLst/>
+  </dgm:styleLbl>
+  <dgm:styleLbl name="node4">
+    <dgm:fillClrLst>
+      <a:schemeClr val="accent4"/>
+    </dgm:fillClrLst>
+    <dgm:linClrLst meth="repeat">
+      <a:schemeClr val="lt1"/>
+    </dgm:linClrLst>
+    <dgm:effectClrLst/>
+    <dgm:txLinClrLst/>
+    <dgm:txFillClrLst/>
+    <dgm:txEffectClrLst/>
+  </dgm:styleLbl>
+  <dgm:styleLbl name="fgImgPlace1">
+    <dgm:fillClrLst meth="repeat">
+      <a:schemeClr val="accent2">
+        <a:tint val="50000"/>
+      </a:schemeClr>
+      <a:schemeClr val="accent3">
+        <a:tint val="50000"/>
+      </a:schemeClr>
+      <a:schemeClr val="accent4">
+        <a:tint val="50000"/>
+      </a:schemeClr>
+      <a:schemeClr val="accent5">
+        <a:tint val="50000"/>
+      </a:schemeClr>
+      <a:schemeClr val="accent6">
+        <a:tint val="50000"/>
+      </a:schemeClr>
+    </dgm:fillClrLst>
+    <dgm:linClrLst meth="repeat">
+      <a:schemeClr val="lt1"/>
+    </dgm:linClrLst>
+    <dgm:effectClrLst/>
+    <dgm:txLinClrLst/>
+    <dgm:txFillClrLst meth="repeat">
+      <a:schemeClr val="lt1"/>
+    </dgm:txFillClrLst>
+    <dgm:txEffectClrLst/>
+  </dgm:styleLbl>
+  <dgm:styleLbl name="alignImgPlace1">
+    <dgm:fillClrLst>
+      <a:schemeClr val="accent1">
+        <a:tint val="50000"/>
+      </a:schemeClr>
+      <a:schemeClr val="accent2">
+        <a:tint val="20000"/>
+      </a:schemeClr>
+    </dgm:fillClrLst>
+    <dgm:linClrLst meth="repeat">
+      <a:schemeClr val="lt1"/>
+    </dgm:linClrLst>
+    <dgm:effectClrLst/>
+    <dgm:txLinClrLst/>
+    <dgm:txFillClrLst meth="repeat">
+      <a:schemeClr val="lt1"/>
+    </dgm:txFillClrLst>
+    <dgm:txEffectClrLst/>
+  </dgm:styleLbl>
+  <dgm:styleLbl name="bgImgPlace1">
+    <dgm:fillClrLst>
+      <a:schemeClr val="accent1">
+        <a:tint val="50000"/>
+      </a:schemeClr>
+      <a:schemeClr val="accent2">
+        <a:tint val="20000"/>
+      </a:schemeClr>
+    </dgm:fillClrLst>
+    <dgm:linClrLst meth="repeat">
+      <a:schemeClr val="lt1"/>
+    </dgm:linClrLst>
+    <dgm:effectClrLst/>
+    <dgm:txLinClrLst/>
+    <dgm:txFillClrLst meth="repeat">
+      <a:schemeClr val="lt1"/>
+    </dgm:txFillClrLst>
+    <dgm:txEffectClrLst/>
+  </dgm:styleLbl>
+  <dgm:styleLbl name="sibTrans2D1">
+    <dgm:fillClrLst meth="repeat">
+      <a:schemeClr val="accent2"/>
+      <a:schemeClr val="accent3"/>
+      <a:schemeClr val="accent4"/>
+      <a:schemeClr val="accent5"/>
+      <a:schemeClr val="accent6"/>
+    </dgm:fillClrLst>
+    <dgm:linClrLst meth="cycle">
+      <a:schemeClr val="lt1"/>
+    </dgm:linClrLst>
+    <dgm:effectClrLst/>
+    <dgm:txLinClrLst/>
+    <dgm:txFillClrLst/>
+    <dgm:txEffectClrLst/>
+  </dgm:styleLbl>
+  <dgm:styleLbl name="fgSibTrans2D1">
+    <dgm:fillClrLst meth="repeat">
+      <a:schemeClr val="accent2"/>
+      <a:schemeClr val="accent3"/>
+      <a:schemeClr val="accent4"/>
+      <a:schemeClr val="accent5"/>
+      <a:schemeClr val="accent6"/>
+    </dgm:fillClrLst>
+    <dgm:linClrLst meth="cycle">
+      <a:schemeClr val="lt1"/>
+    </dgm:linClrLst>
+    <dgm:effectClrLst/>
+    <dgm:txLinClrLst/>
+    <dgm:txFillClrLst meth="repeat">
+      <a:schemeClr val="lt1"/>
+    </dgm:txFillClrLst>
+    <dgm:txEffectClrLst/>
+  </dgm:styleLbl>
+  <dgm:styleLbl name="bgSibTrans2D1">
+    <dgm:fillClrLst meth="repeat">
+      <a:schemeClr val="accent2"/>
+      <a:schemeClr val="accent3"/>
+      <a:schemeClr val="accent4"/>
+      <a:schemeClr val="accent5"/>
+      <a:schemeClr val="accent6"/>
+    </dgm:fillClrLst>
+    <dgm:linClrLst meth="cycle">
+      <a:schemeClr val="lt1"/>
+    </dgm:linClrLst>
+    <dgm:effectClrLst/>
+    <dgm:txLinClrLst/>
+    <dgm:txFillClrLst meth="repeat">
+      <a:schemeClr val="lt1"/>
+    </dgm:txFillClrLst>
+    <dgm:txEffectClrLst/>
+  </dgm:styleLbl>
+  <dgm:styleLbl name="sibTrans1D1">
+    <dgm:fillClrLst meth="repeat">
+      <a:schemeClr val="accent2"/>
+      <a:schemeClr val="accent3"/>
+      <a:schemeClr val="accent4"/>
+      <a:schemeClr val="accent5"/>
+      <a:schemeClr val="accent6"/>
+    </dgm:fillClrLst>
+    <dgm:linClrLst meth="repeat">
+      <a:schemeClr val="accent2"/>
+      <a:schemeClr val="accent3"/>
+      <a:schemeClr val="accent4"/>
+      <a:schemeClr val="accent5"/>
+      <a:schemeClr val="accent6"/>
+    </dgm:linClrLst>
+    <dgm:effectClrLst/>
+    <dgm:txLinClrLst/>
+    <dgm:txFillClrLst meth="repeat">
+      <a:schemeClr val="tx1"/>
+    </dgm:txFillClrLst>
+    <dgm:txEffectClrLst/>
+  </dgm:styleLbl>
+  <dgm:styleLbl name="callout">
+    <dgm:fillClrLst meth="repeat">
+      <a:schemeClr val="accent2"/>
+    </dgm:fillClrLst>
+    <dgm:linClrLst meth="repeat">
+      <a:schemeClr val="accent2">
+        <a:tint val="50000"/>
+      </a:schemeClr>
+    </dgm:linClrLst>
+    <dgm:effectClrLst/>
+    <dgm:txLinClrLst/>
+    <dgm:txFillClrLst meth="repeat">
+      <a:schemeClr val="tx1"/>
+    </dgm:txFillClrLst>
+    <dgm:txEffectClrLst/>
+  </dgm:styleLbl>
+  <dgm:styleLbl name="asst0">
+    <dgm:fillClrLst meth="repeat">
+      <a:schemeClr val="accent1"/>
+    </dgm:fillClrLst>
+    <dgm:linClrLst meth="repeat">
+      <a:schemeClr val="lt1"/>
+    </dgm:linClrLst>
+    <dgm:effectClrLst/>
+    <dgm:txLinClrLst/>
+    <dgm:txFillClrLst/>
+    <dgm:txEffectClrLst/>
+  </dgm:styleLbl>
+  <dgm:styleLbl name="asst1">
+    <dgm:fillClrLst meth="repeat">
+      <a:schemeClr val="accent2"/>
+    </dgm:fillClrLst>
+    <dgm:linClrLst meth="repeat">
+      <a:schemeClr val="lt1"/>
+    </dgm:linClrLst>
+    <dgm:effectClrLst/>
+    <dgm:txLinClrLst/>
+    <dgm:txFillClrLst/>
+    <dgm:txEffectClrLst/>
+  </dgm:styleLbl>
+  <dgm:styleLbl name="asst2">
+    <dgm:fillClrLst>
+      <a:schemeClr val="accent3"/>
+    </dgm:fillClrLst>
+    <dgm:linClrLst meth="repeat">
+      <a:schemeClr val="lt1"/>
+    </dgm:linClrLst>
+    <dgm:effectClrLst/>
+    <dgm:txLinClrLst/>
+    <dgm:txFillClrLst/>
+    <dgm:txEffectClrLst/>
+  </dgm:styleLbl>
+  <dgm:styleLbl name="asst3">
+    <dgm:fillClrLst>
+      <a:schemeClr val="accent4"/>
+    </dgm:fillClrLst>
+    <dgm:linClrLst meth="repeat">
+      <a:schemeClr val="lt1"/>
+    </dgm:linClrLst>
+    <dgm:effectClrLst/>
+    <dgm:txLinClrLst/>
+    <dgm:txFillClrLst/>
+    <dgm:txEffectClrLst/>
+  </dgm:styleLbl>
+  <dgm:styleLbl name="asst4">
+    <dgm:fillClrLst>
+      <a:schemeClr val="accent5"/>
+    </dgm:fillClrLst>
+    <dgm:linClrLst meth="repeat">
+      <a:schemeClr val="lt1"/>
+    </dgm:linClrLst>
+    <dgm:effectClrLst/>
+    <dgm:txLinClrLst/>
+    <dgm:txFillClrLst/>
+    <dgm:txEffectClrLst/>
+  </dgm:styleLbl>
+  <dgm:styleLbl name="parChTrans2D1">
+    <dgm:fillClrLst meth="repeat">
+      <a:schemeClr val="accent2"/>
+    </dgm:fillClrLst>
+    <dgm:linClrLst meth="repeat">
+      <a:schemeClr val="lt1"/>
+    </dgm:linClrLst>
+    <dgm:effectClrLst/>
+    <dgm:txLinClrLst/>
+    <dgm:txFillClrLst meth="repeat">
+      <a:schemeClr val="lt1"/>
+    </dgm:txFillClrLst>
+    <dgm:txEffectClrLst/>
+  </dgm:styleLbl>
+  <dgm:styleLbl name="parChTrans2D2">
+    <dgm:fillClrLst meth="repeat">
+      <a:schemeClr val="accent3"/>
+    </dgm:fillClrLst>
+    <dgm:linClrLst meth="repeat">
+      <a:schemeClr val="lt1"/>
+    </dgm:linClrLst>
+    <dgm:effectClrLst/>
+    <dgm:txLinClrLst/>
+    <dgm:txFillClrLst/>
+    <dgm:txEffectClrLst/>
+  </dgm:styleLbl>
+  <dgm:styleLbl name="parChTrans2D3">
+    <dgm:fillClrLst meth="repeat">
+      <a:schemeClr val="accent4"/>
+    </dgm:fillClrLst>
+    <dgm:linClrLst meth="repeat">
+      <a:schemeClr val="lt1"/>
+    </dgm:linClrLst>
+    <dgm:effectClrLst/>
+    <dgm:txLinClrLst/>
+    <dgm:txFillClrLst/>
+    <dgm:txEffectClrLst/>
+  </dgm:styleLbl>
+  <dgm:styleLbl name="parChTrans2D4">
+    <dgm:fillClrLst meth="repeat">
+      <a:schemeClr val="accent5"/>
+    </dgm:fillClrLst>
+    <dgm:linClrLst meth="repeat">
+      <a:schemeClr val="lt1"/>
+    </dgm:linClrLst>
+    <dgm:effectClrLst/>
+    <dgm:txLinClrLst/>
+    <dgm:txFillClrLst meth="repeat">
+      <a:schemeClr val="lt1"/>
+    </dgm:txFillClrLst>
+    <dgm:txEffectClrLst/>
+  </dgm:styleLbl>
+  <dgm:styleLbl name="parChTrans1D1">
+    <dgm:fillClrLst meth="repeat">
+      <a:schemeClr val="accent2"/>
+    </dgm:fillClrLst>
+    <dgm:linClrLst meth="repeat">
+      <a:schemeClr val="accent1"/>
+    </dgm:linClrLst>
+    <dgm:effectClrLst/>
+    <dgm:txLinClrLst/>
+    <dgm:txFillClrLst meth="repeat">
+      <a:schemeClr val="tx1"/>
+    </dgm:txFillClrLst>
+    <dgm:txEffectClrLst/>
+  </dgm:styleLbl>
+  <dgm:styleLbl name="parChTrans1D2">
+    <dgm:fillClrLst meth="repeat">
+      <a:schemeClr val="accent3">
+        <a:tint val="90000"/>
+      </a:schemeClr>
+    </dgm:fillClrLst>
+    <dgm:linClrLst meth="repeat">
+      <a:schemeClr val="accent2"/>
+    </dgm:linClrLst>
+    <dgm:effectClrLst/>
+    <dgm:txLinClrLst/>
+    <dgm:txFillClrLst meth="repeat">
+      <a:schemeClr val="tx1"/>
+    </dgm:txFillClrLst>
+    <dgm:txEffectClrLst/>
+  </dgm:styleLbl>
+  <dgm:styleLbl name="parChTrans1D3">
+    <dgm:fillClrLst meth="repeat">
+      <a:schemeClr val="accent4">
+        <a:tint val="70000"/>
+      </a:schemeClr>
+    </dgm:fillClrLst>
+    <dgm:linClrLst meth="repeat">
+      <a:schemeClr val="accent3"/>
+    </dgm:linClrLst>
+    <dgm:effectClrLst/>
+    <dgm:txLinClrLst/>
+    <dgm:txFillClrLst meth="repeat">
+      <a:schemeClr val="tx1"/>
+    </dgm:txFillClrLst>
+    <dgm:txEffectClrLst/>
+  </dgm:styleLbl>
+  <dgm:styleLbl name="parChTrans1D4">
+    <dgm:fillClrLst meth="repeat">
+      <a:schemeClr val="accent5">
+        <a:tint val="50000"/>
+      </a:schemeClr>
+    </dgm:fillClrLst>
+    <dgm:linClrLst meth="repeat">
+      <a:schemeClr val="accent4"/>
+    </dgm:linClrLst>
+    <dgm:effectClrLst/>
+    <dgm:txLinClrLst/>
+    <dgm:txFillClrLst meth="repeat">
+      <a:schemeClr val="tx1"/>
+    </dgm:txFillClrLst>
+    <dgm:txEffectClrLst/>
+  </dgm:styleLbl>
+  <dgm:styleLbl name="fgAcc1">
+    <dgm:fillClrLst meth="repeat">
+      <a:schemeClr val="lt1">
+        <a:alpha val="90000"/>
+      </a:schemeClr>
+    </dgm:fillClrLst>
+    <dgm:linClrLst meth="repeat">
+      <a:schemeClr val="accent2"/>
+      <a:schemeClr val="accent3"/>
+      <a:schemeClr val="accent4"/>
+      <a:schemeClr val="accent5"/>
+      <a:schemeClr val="accent6"/>
+    </dgm:linClrLst>
+    <dgm:effectClrLst/>
+    <dgm:txLinClrLst/>
+    <dgm:txFillClrLst meth="repeat">
+      <a:schemeClr val="dk1"/>
+    </dgm:txFillClrLst>
+    <dgm:txEffectClrLst/>
+  </dgm:styleLbl>
+  <dgm:styleLbl name="conFgAcc1">
+    <dgm:fillClrLst meth="repeat">
+      <a:schemeClr val="lt1">
+        <a:alpha val="90000"/>
+      </a:schemeClr>
+    </dgm:fillClrLst>
+    <dgm:linClrLst meth="repeat">
+      <a:schemeClr val="accent2"/>
+      <a:schemeClr val="accent3"/>
+      <a:schemeClr val="accent4"/>
+      <a:schemeClr val="accent5"/>
+      <a:schemeClr val="accent6"/>
+    </dgm:linClrLst>
+    <dgm:effectClrLst/>
+    <dgm:txLinClrLst/>
+    <dgm:txFillClrLst meth="repeat">
+      <a:schemeClr val="dk1"/>
+    </dgm:txFillClrLst>
+    <dgm:txEffectClrLst/>
+  </dgm:styleLbl>
+  <dgm:styleLbl name="alignAcc1">
+    <dgm:fillClrLst meth="repeat">
+      <a:schemeClr val="lt1">
+        <a:alpha val="90000"/>
+      </a:schemeClr>
+    </dgm:fillClrLst>
+    <dgm:linClrLst meth="repeat">
+      <a:schemeClr val="accent2"/>
+      <a:schemeClr val="accent3"/>
+      <a:schemeClr val="accent4"/>
+      <a:schemeClr val="accent5"/>
+      <a:schemeClr val="accent6"/>
+    </dgm:linClrLst>
+    <dgm:effectClrLst/>
+    <dgm:txLinClrLst/>
+    <dgm:txFillClrLst meth="repeat">
+      <a:schemeClr val="dk1"/>
+    </dgm:txFillClrLst>
+    <dgm:txEffectClrLst/>
+  </dgm:styleLbl>
+  <dgm:styleLbl name="trAlignAcc1">
+    <dgm:fillClrLst meth="repeat">
+      <a:schemeClr val="lt1">
+        <a:alpha val="40000"/>
+      </a:schemeClr>
+    </dgm:fillClrLst>
+    <dgm:linClrLst meth="repeat">
+      <a:schemeClr val="accent1"/>
+    </dgm:linClrLst>
+    <dgm:effectClrLst/>
+    <dgm:txLinClrLst/>
+    <dgm:txFillClrLst meth="repeat">
+      <a:schemeClr val="dk1"/>
+    </dgm:txFillClrLst>
+    <dgm:txEffectClrLst/>
+  </dgm:styleLbl>
+  <dgm:styleLbl name="bgAcc1">
+    <dgm:fillClrLst meth="repeat">
+      <a:schemeClr val="lt1">
+        <a:alpha val="90000"/>
+      </a:schemeClr>
+    </dgm:fillClrLst>
+    <dgm:linClrLst meth="repeat">
+      <a:schemeClr val="accent2"/>
+      <a:schemeClr val="accent3"/>
+      <a:schemeClr val="accent4"/>
+      <a:schemeClr val="accent5"/>
+      <a:schemeClr val="accent6"/>
+    </dgm:linClrLst>
+    <dgm:effectClrLst/>
+    <dgm:txLinClrLst/>
+    <dgm:txFillClrLst meth="repeat">
+      <a:schemeClr val="dk1"/>
+    </dgm:txFillClrLst>
+    <dgm:txEffectClrLst/>
+  </dgm:styleLbl>
+  <dgm:styleLbl name="solidFgAcc1">
+    <dgm:fillClrLst meth="repeat">
+      <a:schemeClr val="lt1"/>
+    </dgm:fillClrLst>
+    <dgm:linClrLst meth="repeat">
+      <a:schemeClr val="accent2"/>
+      <a:schemeClr val="accent3"/>
+      <a:schemeClr val="accent4"/>
+      <a:schemeClr val="accent5"/>
+      <a:schemeClr val="accent6"/>
+    </dgm:linClrLst>
+    <dgm:effectClrLst/>
+    <dgm:txLinClrLst/>
+    <dgm:txFillClrLst meth="repeat">
+      <a:schemeClr val="dk1"/>
+    </dgm:txFillClrLst>
+    <dgm:txEffectClrLst/>
+  </dgm:styleLbl>
+  <dgm:styleLbl name="solidAlignAcc1">
+    <dgm:fillClrLst meth="repeat">
+      <a:schemeClr val="lt1"/>
+    </dgm:fillClrLst>
+    <dgm:linClrLst meth="repeat">
+      <a:schemeClr val="accent2"/>
+      <a:schemeClr val="accent3"/>
+      <a:schemeClr val="accent4"/>
+      <a:schemeClr val="accent5"/>
+      <a:schemeClr val="accent6"/>
+    </dgm:linClrLst>
+    <dgm:effectClrLst/>
+    <dgm:txLinClrLst/>
+    <dgm:txFillClrLst meth="repeat">
+      <a:schemeClr val="dk1"/>
+    </dgm:txFillClrLst>
+    <dgm:txEffectClrLst/>
+  </dgm:styleLbl>
+  <dgm:styleLbl name="solidBgAcc1">
+    <dgm:fillClrLst meth="repeat">
+      <a:schemeClr val="lt1"/>
+    </dgm:fillClrLst>
+    <dgm:linClrLst meth="repeat">
+      <a:schemeClr val="accent2"/>
+      <a:schemeClr val="accent3"/>
+      <a:schemeClr val="accent4"/>
+      <a:schemeClr val="accent5"/>
+      <a:schemeClr val="accent6"/>
+    </dgm:linClrLst>
+    <dgm:effectClrLst/>
+    <dgm:txLinClrLst/>
+    <dgm:txFillClrLst meth="repeat">
+      <a:schemeClr val="dk1"/>
+    </dgm:txFillClrLst>
+    <dgm:txEffectClrLst/>
+  </dgm:styleLbl>
+  <dgm:styleLbl name="fgAccFollowNode1">
+    <dgm:fillClrLst meth="repeat">
+      <a:schemeClr val="accent2">
+        <a:tint val="40000"/>
+        <a:alpha val="90000"/>
+      </a:schemeClr>
+      <a:schemeClr val="accent3">
+        <a:tint val="40000"/>
+        <a:alpha val="90000"/>
+      </a:schemeClr>
+      <a:schemeClr val="accent4">
+        <a:tint val="40000"/>
+        <a:alpha val="90000"/>
+      </a:schemeClr>
+      <a:schemeClr val="accent5">
+        <a:tint val="40000"/>
+        <a:alpha val="90000"/>
+      </a:schemeClr>
+      <a:schemeClr val="accent6">
+        <a:tint val="40000"/>
+        <a:alpha val="90000"/>
+      </a:schemeClr>
+    </dgm:fillClrLst>
+    <dgm:linClrLst meth="repeat">
+      <a:schemeClr val="accent2">
+        <a:tint val="40000"/>
+        <a:alpha val="90000"/>
+      </a:schemeClr>
+      <a:schemeClr val="accent3">
+        <a:tint val="40000"/>
+        <a:alpha val="90000"/>
+      </a:schemeClr>
+      <a:schemeClr val="accent4">
+        <a:tint val="40000"/>
+        <a:alpha val="90000"/>
+      </a:schemeClr>
+      <a:schemeClr val="accent5">
+        <a:tint val="40000"/>
+        <a:alpha val="90000"/>
+      </a:schemeClr>
+      <a:schemeClr val="accent6">
+        <a:tint val="40000"/>
+        <a:alpha val="90000"/>
+      </a:schemeClr>
+    </dgm:linClrLst>
+    <dgm:effectClrLst/>
+    <dgm:txLinClrLst/>
+    <dgm:txFillClrLst meth="repeat">
+      <a:schemeClr val="dk1"/>
+    </dgm:txFillClrLst>
+    <dgm:txEffectClrLst/>
+  </dgm:styleLbl>
+  <dgm:styleLbl name="alignAccFollowNode1">
+    <dgm:fillClrLst meth="repeat">
+      <a:schemeClr val="accent2">
+        <a:tint val="40000"/>
+        <a:alpha val="90000"/>
+      </a:schemeClr>
+      <a:schemeClr val="accent3">
+        <a:tint val="40000"/>
+        <a:alpha val="90000"/>
+      </a:schemeClr>
+      <a:schemeClr val="accent4">
+        <a:tint val="40000"/>
+        <a:alpha val="90000"/>
+      </a:schemeClr>
+      <a:schemeClr val="accent5">
+        <a:tint val="40000"/>
+        <a:alpha val="90000"/>
+      </a:schemeClr>
+      <a:schemeClr val="accent6">
+        <a:tint val="40000"/>
+        <a:alpha val="90000"/>
+      </a:schemeClr>
+    </dgm:fillClrLst>
+    <dgm:linClrLst meth="repeat">
+      <a:schemeClr val="accent2">
+        <a:tint val="40000"/>
+        <a:alpha val="90000"/>
+      </a:schemeClr>
+      <a:schemeClr val="accent3">
+        <a:tint val="40000"/>
+        <a:alpha val="90000"/>
+      </a:schemeClr>
+      <a:schemeClr val="accent4">
+        <a:tint val="40000"/>
+        <a:alpha val="90000"/>
+      </a:schemeClr>
+      <a:schemeClr val="accent5">
+        <a:tint val="40000"/>
+        <a:alpha val="90000"/>
+      </a:schemeClr>
+      <a:schemeClr val="accent6">
+        <a:tint val="40000"/>
+        <a:alpha val="90000"/>
+      </a:schemeClr>
+    </dgm:linClrLst>
+    <dgm:effectClrLst/>
+    <dgm:txLinClrLst/>
+    <dgm:txFillClrLst meth="repeat">
+      <a:schemeClr val="dk1"/>
+    </dgm:txFillClrLst>
+    <dgm:txEffectClrLst/>
+  </dgm:styleLbl>
+  <dgm:styleLbl name="bgAccFollowNode1">
+    <dgm:fillClrLst meth="repeat">
+      <a:schemeClr val="accent2">
+        <a:tint val="40000"/>
+        <a:alpha val="90000"/>
+      </a:schemeClr>
+      <a:schemeClr val="accent3">
+        <a:tint val="40000"/>
+        <a:alpha val="90000"/>
+      </a:schemeClr>
+      <a:schemeClr val="accent4">
+        <a:tint val="40000"/>
+        <a:alpha val="90000"/>
+      </a:schemeClr>
+      <a:schemeClr val="accent5">
+        <a:tint val="40000"/>
+        <a:alpha val="90000"/>
+      </a:schemeClr>
+      <a:schemeClr val="accent6">
+        <a:tint val="40000"/>
+        <a:alpha val="90000"/>
+      </a:schemeClr>
+    </dgm:fillClrLst>
+    <dgm:linClrLst meth="repeat">
+      <a:schemeClr val="accent2">
+        <a:tint val="40000"/>
+        <a:alpha val="90000"/>
+      </a:schemeClr>
+      <a:schemeClr val="accent3">
+        <a:tint val="40000"/>
+        <a:alpha val="90000"/>
+      </a:schemeClr>
+      <a:schemeClr val="accent4">
+        <a:tint val="40000"/>
+        <a:alpha val="90000"/>
+      </a:schemeClr>
+      <a:schemeClr val="accent5">
+        <a:tint val="40000"/>
+        <a:alpha val="90000"/>
+      </a:schemeClr>
+      <a:schemeClr val="accent6">
+        <a:tint val="40000"/>
+        <a:alpha val="90000"/>
+      </a:schemeClr>
+    </dgm:linClrLst>
+    <dgm:effectClrLst/>
+    <dgm:txLinClrLst/>
+    <dgm:txFillClrLst meth="repeat">
+      <a:schemeClr val="dk1"/>
+    </dgm:txFillClrLst>
+    <dgm:txEffectClrLst/>
+  </dgm:styleLbl>
+  <dgm:styleLbl name="fgAcc0">
+    <dgm:fillClrLst meth="repeat">
+      <a:schemeClr val="lt1">
+        <a:alpha val="90000"/>
+      </a:schemeClr>
+    </dgm:fillClrLst>
+    <dgm:linClrLst>
+      <a:schemeClr val="accent1"/>
+    </dgm:linClrLst>
+    <dgm:effectClrLst/>
+    <dgm:txLinClrLst/>
+    <dgm:txFillClrLst meth="repeat">
+      <a:schemeClr val="dk1"/>
+    </dgm:txFillClrLst>
+    <dgm:txEffectClrLst/>
+  </dgm:styleLbl>
+  <dgm:styleLbl name="fgAcc2">
+    <dgm:fillClrLst meth="repeat">
+      <a:schemeClr val="lt1">
+        <a:alpha val="90000"/>
+      </a:schemeClr>
+    </dgm:fillClrLst>
+    <dgm:linClrLst>
+      <a:schemeClr val="accent2"/>
+    </dgm:linClrLst>
+    <dgm:effectClrLst/>
+    <dgm:txLinClrLst/>
+    <dgm:txFillClrLst meth="repeat">
+      <a:schemeClr val="dk1"/>
+    </dgm:txFillClrLst>
+    <dgm:txEffectClrLst/>
+  </dgm:styleLbl>
+  <dgm:styleLbl name="fgAcc3">
+    <dgm:fillClrLst meth="repeat">
+      <a:schemeClr val="lt1">
+        <a:alpha val="90000"/>
+      </a:schemeClr>
+    </dgm:fillClrLst>
+    <dgm:linClrLst>
+      <a:schemeClr val="accent3"/>
+    </dgm:linClrLst>
+    <dgm:effectClrLst/>
+    <dgm:txLinClrLst/>
+    <dgm:txFillClrLst meth="repeat">
+      <a:schemeClr val="dk1"/>
+    </dgm:txFillClrLst>
+    <dgm:txEffectClrLst/>
+  </dgm:styleLbl>
+  <dgm:styleLbl name="fgAcc4">
+    <dgm:fillClrLst meth="repeat">
+      <a:schemeClr val="lt1">
+        <a:alpha val="90000"/>
+      </a:schemeClr>
+    </dgm:fillClrLst>
+    <dgm:linClrLst>
+      <a:schemeClr val="accent4"/>
+    </dgm:linClrLst>
+    <dgm:effectClrLst/>
+    <dgm:txLinClrLst/>
+    <dgm:txFillClrLst meth="repeat">
+      <a:schemeClr val="dk1"/>
+    </dgm:txFillClrLst>
+    <dgm:txEffectClrLst/>
+  </dgm:styleLbl>
+  <dgm:styleLbl name="bgShp">
+    <dgm:fillClrLst meth="repeat">
+      <a:schemeClr val="accent2">
+        <a:tint val="40000"/>
+      </a:schemeClr>
+    </dgm:fillClrLst>
+    <dgm:linClrLst meth="repeat">
+      <a:schemeClr val="dk1"/>
+    </dgm:linClrLst>
+    <dgm:effectClrLst/>
+    <dgm:txLinClrLst/>
+    <dgm:txFillClrLst meth="repeat">
+      <a:schemeClr val="dk1"/>
+    </dgm:txFillClrLst>
+    <dgm:txEffectClrLst/>
+  </dgm:styleLbl>
+  <dgm:styleLbl name="dkBgShp">
+    <dgm:fillClrLst meth="repeat">
+      <a:schemeClr val="accent2">
+        <a:shade val="90000"/>
+      </a:schemeClr>
+    </dgm:fillClrLst>
+    <dgm:linClrLst meth="repeat">
+      <a:schemeClr val="dk1"/>
+    </dgm:linClrLst>
+    <dgm:effectClrLst/>
+    <dgm:txLinClrLst/>
+    <dgm:txFillClrLst meth="repeat">
+      <a:schemeClr val="lt1"/>
+    </dgm:txFillClrLst>
+    <dgm:txEffectClrLst/>
+  </dgm:styleLbl>
+  <dgm:styleLbl name="trBgShp">
+    <dgm:fillClrLst meth="repeat">
+      <a:schemeClr val="accent1">
+        <a:tint val="50000"/>
+        <a:alpha val="40000"/>
+      </a:schemeClr>
+    </dgm:fillClrLst>
+    <dgm:linClrLst meth="repeat">
+      <a:schemeClr val="accent2"/>
+    </dgm:linClrLst>
+    <dgm:effectClrLst/>
+    <dgm:txLinClrLst/>
+    <dgm:txFillClrLst meth="repeat">
+      <a:schemeClr val="lt1"/>
+    </dgm:txFillClrLst>
+    <dgm:txEffectClrLst/>
+  </dgm:styleLbl>
+  <dgm:styleLbl name="fgShp">
+    <dgm:fillClrLst meth="repeat">
+      <a:schemeClr val="accent2">
+        <a:tint val="40000"/>
       </a:schemeClr>
     </dgm:fillClrLst>
     <dgm:linClrLst meth="repeat">
@@ -1284,6 +2203,321 @@
     <dgm:cxn modelId="{3FC5C48A-66C3-4DDA-81A4-8E310CC7DF9B}" type="presParOf" srcId="{6542AC7F-1905-4869-B35B-9051DDA599CC}" destId="{8658C034-C21F-4155-8F67-3540F50064FD}" srcOrd="0" destOrd="0" presId="urn:microsoft.com/office/officeart/2018/2/layout/IconLabelList"/>
     <dgm:cxn modelId="{452A264D-9857-4B38-B3F5-7DE2B5898A29}" type="presParOf" srcId="{6542AC7F-1905-4869-B35B-9051DDA599CC}" destId="{2330807A-746F-4A5F-9C87-0264AC5F7002}" srcOrd="1" destOrd="0" presId="urn:microsoft.com/office/officeart/2018/2/layout/IconLabelList"/>
     <dgm:cxn modelId="{18259FBB-FD5D-4C25-BA46-87CFB669AEA7}" type="presParOf" srcId="{6542AC7F-1905-4869-B35B-9051DDA599CC}" destId="{33711326-B709-4C0E-9525-4EE8CB51478E}" srcOrd="2" destOrd="0" presId="urn:microsoft.com/office/officeart/2018/2/layout/IconLabelList"/>
+  </dgm:cxnLst>
+  <dgm:bg/>
+  <dgm:whole/>
+  <dgm:extLst>
+    <a:ext uri="http://schemas.microsoft.com/office/drawing/2008/diagram">
+      <dsp:dataModelExt xmlns:dsp="http://schemas.microsoft.com/office/drawing/2008/diagram" relId="rId6" minVer="http://schemas.openxmlformats.org/drawingml/2006/diagram"/>
+    </a:ext>
+  </dgm:extLst>
+</dgm:dataModel>
+</file>
+
+<file path=ppt/diagrams/data2.xml><?xml version="1.0" encoding="utf-8"?>
+<dgm:dataModel xmlns:dgm="http://schemas.openxmlformats.org/drawingml/2006/diagram" xmlns:a="http://schemas.openxmlformats.org/drawingml/2006/main">
+  <dgm:ptLst>
+    <dgm:pt modelId="{119D1B9D-93FA-4EAB-AA15-31F9764A1702}" type="doc">
+      <dgm:prSet loTypeId="urn:microsoft.com/office/officeart/2018/2/layout/IconLabelList" loCatId="icon" qsTypeId="urn:microsoft.com/office/officeart/2005/8/quickstyle/simple1" qsCatId="simple" csTypeId="urn:microsoft.com/office/officeart/2005/8/colors/colorful1" csCatId="colorful" phldr="1"/>
+      <dgm:spPr/>
+      <dgm:t>
+        <a:bodyPr/>
+        <a:lstStyle/>
+        <a:p>
+          <a:endParaRPr lang="en-US"/>
+        </a:p>
+      </dgm:t>
+    </dgm:pt>
+    <dgm:pt modelId="{26D5102E-056D-4D72-A046-B085B7E88976}">
+      <dgm:prSet/>
+      <dgm:spPr/>
+      <dgm:t>
+        <a:bodyPr/>
+        <a:lstStyle/>
+        <a:p>
+          <a:pPr>
+            <a:lnSpc>
+              <a:spcPct val="100000"/>
+            </a:lnSpc>
+          </a:pPr>
+          <a:r>
+            <a:rPr lang="de-CH"/>
+            <a:t>Leverage what you already know</a:t>
+          </a:r>
+          <a:endParaRPr lang="en-US"/>
+        </a:p>
+      </dgm:t>
+    </dgm:pt>
+    <dgm:pt modelId="{F81B2171-7BBD-469C-BC55-FA99E147D069}" type="parTrans" cxnId="{E8AB2F2E-E973-4C0A-A19C-9CF23414FF24}">
+      <dgm:prSet/>
+      <dgm:spPr/>
+      <dgm:t>
+        <a:bodyPr/>
+        <a:lstStyle/>
+        <a:p>
+          <a:endParaRPr lang="en-US"/>
+        </a:p>
+      </dgm:t>
+    </dgm:pt>
+    <dgm:pt modelId="{688F1B4E-D05A-4B98-98EC-C40DB77A9AE5}" type="sibTrans" cxnId="{E8AB2F2E-E973-4C0A-A19C-9CF23414FF24}">
+      <dgm:prSet/>
+      <dgm:spPr/>
+      <dgm:t>
+        <a:bodyPr/>
+        <a:lstStyle/>
+        <a:p>
+          <a:endParaRPr lang="en-US"/>
+        </a:p>
+      </dgm:t>
+    </dgm:pt>
+    <dgm:pt modelId="{AC73764E-6681-48FF-8E3C-7F16EC36959D}">
+      <dgm:prSet/>
+      <dgm:spPr/>
+      <dgm:t>
+        <a:bodyPr/>
+        <a:lstStyle/>
+        <a:p>
+          <a:pPr>
+            <a:lnSpc>
+              <a:spcPct val="100000"/>
+            </a:lnSpc>
+          </a:pPr>
+          <a:r>
+            <a:rPr lang="de-CH"/>
+            <a:t>Robots react to their environment </a:t>
+          </a:r>
+          <a:endParaRPr lang="en-US"/>
+        </a:p>
+      </dgm:t>
+    </dgm:pt>
+    <dgm:pt modelId="{3B8B8292-03FC-49C8-B1C2-BC4E98057A0C}" type="parTrans" cxnId="{F6576D33-55BE-4B8F-8367-CFCE62422862}">
+      <dgm:prSet/>
+      <dgm:spPr/>
+      <dgm:t>
+        <a:bodyPr/>
+        <a:lstStyle/>
+        <a:p>
+          <a:endParaRPr lang="en-US"/>
+        </a:p>
+      </dgm:t>
+    </dgm:pt>
+    <dgm:pt modelId="{86BFC2BA-703F-423E-9E45-38DE60DB4480}" type="sibTrans" cxnId="{F6576D33-55BE-4B8F-8367-CFCE62422862}">
+      <dgm:prSet/>
+      <dgm:spPr/>
+      <dgm:t>
+        <a:bodyPr/>
+        <a:lstStyle/>
+        <a:p>
+          <a:endParaRPr lang="en-US"/>
+        </a:p>
+      </dgm:t>
+    </dgm:pt>
+    <dgm:pt modelId="{293DF046-A1C7-403F-8791-2CCC2F7F3863}">
+      <dgm:prSet/>
+      <dgm:spPr/>
+      <dgm:t>
+        <a:bodyPr/>
+        <a:lstStyle/>
+        <a:p>
+          <a:pPr>
+            <a:lnSpc>
+              <a:spcPct val="100000"/>
+            </a:lnSpc>
+          </a:pPr>
+          <a:r>
+            <a:rPr lang="de-CH"/>
+            <a:t>Test small, save big</a:t>
+          </a:r>
+          <a:endParaRPr lang="en-US"/>
+        </a:p>
+      </dgm:t>
+    </dgm:pt>
+    <dgm:pt modelId="{03A23492-4F21-49A8-8D62-ABA762391ABB}" type="parTrans" cxnId="{162BE383-DEAC-498F-BE54-FB253515AB86}">
+      <dgm:prSet/>
+      <dgm:spPr/>
+      <dgm:t>
+        <a:bodyPr/>
+        <a:lstStyle/>
+        <a:p>
+          <a:endParaRPr lang="en-US"/>
+        </a:p>
+      </dgm:t>
+    </dgm:pt>
+    <dgm:pt modelId="{4150777F-0FE9-4FAA-B800-6737A6E2F61A}" type="sibTrans" cxnId="{162BE383-DEAC-498F-BE54-FB253515AB86}">
+      <dgm:prSet/>
+      <dgm:spPr/>
+      <dgm:t>
+        <a:bodyPr/>
+        <a:lstStyle/>
+        <a:p>
+          <a:endParaRPr lang="en-US"/>
+        </a:p>
+      </dgm:t>
+    </dgm:pt>
+    <dgm:pt modelId="{78E9406E-CF16-4E22-9E8D-4056EFEB6E16}" type="pres">
+      <dgm:prSet presAssocID="{119D1B9D-93FA-4EAB-AA15-31F9764A1702}" presName="root" presStyleCnt="0">
+        <dgm:presLayoutVars>
+          <dgm:dir/>
+          <dgm:resizeHandles val="exact"/>
+        </dgm:presLayoutVars>
+      </dgm:prSet>
+      <dgm:spPr/>
+    </dgm:pt>
+    <dgm:pt modelId="{394AAD79-864C-48A0-9F3F-320BAFA33D82}" type="pres">
+      <dgm:prSet presAssocID="{26D5102E-056D-4D72-A046-B085B7E88976}" presName="compNode" presStyleCnt="0"/>
+      <dgm:spPr/>
+    </dgm:pt>
+    <dgm:pt modelId="{43D2D36A-E1FF-49B6-9AD1-A6C0D3213F6E}" type="pres">
+      <dgm:prSet presAssocID="{26D5102E-056D-4D72-A046-B085B7E88976}" presName="iconRect" presStyleLbl="node1" presStyleIdx="0" presStyleCnt="3"/>
+      <dgm:spPr>
+        <a:blipFill>
+          <a:blip xmlns:r="http://schemas.openxmlformats.org/officeDocument/2006/relationships" r:embed="rId1">
+            <a:extLst>
+              <a:ext uri="{28A0092B-C50C-407E-A947-70E740481C1C}">
+                <a14:useLocalDpi xmlns:a14="http://schemas.microsoft.com/office/drawing/2010/main" val="0"/>
+              </a:ext>
+              <a:ext uri="{96DAC541-7B7A-43D3-8B79-37D633B846F1}">
+                <asvg:svgBlip xmlns:asvg="http://schemas.microsoft.com/office/drawing/2016/SVG/main" r:embed="rId2"/>
+              </a:ext>
+            </a:extLst>
+          </a:blip>
+          <a:stretch>
+            <a:fillRect/>
+          </a:stretch>
+        </a:blipFill>
+      </dgm:spPr>
+      <dgm:extLst>
+        <a:ext uri="{E40237B7-FDA0-4F09-8148-C483321AD2D9}">
+          <dgm14:cNvPr xmlns:dgm14="http://schemas.microsoft.com/office/drawing/2010/diagram" id="0" name="" descr="Head with Gears"/>
+        </a:ext>
+      </dgm:extLst>
+    </dgm:pt>
+    <dgm:pt modelId="{5E293013-3226-403E-9551-455E1659A6DC}" type="pres">
+      <dgm:prSet presAssocID="{26D5102E-056D-4D72-A046-B085B7E88976}" presName="spaceRect" presStyleCnt="0"/>
+      <dgm:spPr/>
+    </dgm:pt>
+    <dgm:pt modelId="{51BB67F4-A4F5-455D-9EBF-83B31106AAFD}" type="pres">
+      <dgm:prSet presAssocID="{26D5102E-056D-4D72-A046-B085B7E88976}" presName="textRect" presStyleLbl="revTx" presStyleIdx="0" presStyleCnt="3">
+        <dgm:presLayoutVars>
+          <dgm:chMax val="1"/>
+          <dgm:chPref val="1"/>
+        </dgm:presLayoutVars>
+      </dgm:prSet>
+      <dgm:spPr/>
+    </dgm:pt>
+    <dgm:pt modelId="{ED0350B0-88CA-4E11-A527-CB853DD63903}" type="pres">
+      <dgm:prSet presAssocID="{688F1B4E-D05A-4B98-98EC-C40DB77A9AE5}" presName="sibTrans" presStyleCnt="0"/>
+      <dgm:spPr/>
+    </dgm:pt>
+    <dgm:pt modelId="{E0A1EFD2-489F-4CF7-8E94-1A47140B84F9}" type="pres">
+      <dgm:prSet presAssocID="{AC73764E-6681-48FF-8E3C-7F16EC36959D}" presName="compNode" presStyleCnt="0"/>
+      <dgm:spPr/>
+    </dgm:pt>
+    <dgm:pt modelId="{A23150EC-9444-43C1-95E6-4ADDC2BCD192}" type="pres">
+      <dgm:prSet presAssocID="{AC73764E-6681-48FF-8E3C-7F16EC36959D}" presName="iconRect" presStyleLbl="node1" presStyleIdx="1" presStyleCnt="3"/>
+      <dgm:spPr>
+        <a:blipFill>
+          <a:blip xmlns:r="http://schemas.openxmlformats.org/officeDocument/2006/relationships" r:embed="rId3">
+            <a:extLst>
+              <a:ext uri="{28A0092B-C50C-407E-A947-70E740481C1C}">
+                <a14:useLocalDpi xmlns:a14="http://schemas.microsoft.com/office/drawing/2010/main" val="0"/>
+              </a:ext>
+              <a:ext uri="{96DAC541-7B7A-43D3-8B79-37D633B846F1}">
+                <asvg:svgBlip xmlns:asvg="http://schemas.microsoft.com/office/drawing/2016/SVG/main" r:embed="rId4"/>
+              </a:ext>
+            </a:extLst>
+          </a:blip>
+          <a:stretch>
+            <a:fillRect/>
+          </a:stretch>
+        </a:blipFill>
+      </dgm:spPr>
+      <dgm:extLst>
+        <a:ext uri="{E40237B7-FDA0-4F09-8148-C483321AD2D9}">
+          <dgm14:cNvPr xmlns:dgm14="http://schemas.microsoft.com/office/drawing/2010/diagram" id="0" name="" descr="Roboter"/>
+        </a:ext>
+      </dgm:extLst>
+    </dgm:pt>
+    <dgm:pt modelId="{142FDFE1-88DF-46FF-9085-081EE57057B8}" type="pres">
+      <dgm:prSet presAssocID="{AC73764E-6681-48FF-8E3C-7F16EC36959D}" presName="spaceRect" presStyleCnt="0"/>
+      <dgm:spPr/>
+    </dgm:pt>
+    <dgm:pt modelId="{AC622F39-56A1-43AC-9AC9-D73AA1DE56F9}" type="pres">
+      <dgm:prSet presAssocID="{AC73764E-6681-48FF-8E3C-7F16EC36959D}" presName="textRect" presStyleLbl="revTx" presStyleIdx="1" presStyleCnt="3">
+        <dgm:presLayoutVars>
+          <dgm:chMax val="1"/>
+          <dgm:chPref val="1"/>
+        </dgm:presLayoutVars>
+      </dgm:prSet>
+      <dgm:spPr/>
+    </dgm:pt>
+    <dgm:pt modelId="{FC56F260-4888-4156-B4E1-D3C56FD6C323}" type="pres">
+      <dgm:prSet presAssocID="{86BFC2BA-703F-423E-9E45-38DE60DB4480}" presName="sibTrans" presStyleCnt="0"/>
+      <dgm:spPr/>
+    </dgm:pt>
+    <dgm:pt modelId="{64407DE2-0526-40C5-8B93-37FD6A2775A7}" type="pres">
+      <dgm:prSet presAssocID="{293DF046-A1C7-403F-8791-2CCC2F7F3863}" presName="compNode" presStyleCnt="0"/>
+      <dgm:spPr/>
+    </dgm:pt>
+    <dgm:pt modelId="{E2A27A26-0FBE-4566-A2FD-3E494E2F285D}" type="pres">
+      <dgm:prSet presAssocID="{293DF046-A1C7-403F-8791-2CCC2F7F3863}" presName="iconRect" presStyleLbl="node1" presStyleIdx="2" presStyleCnt="3"/>
+      <dgm:spPr>
+        <a:blipFill>
+          <a:blip xmlns:r="http://schemas.openxmlformats.org/officeDocument/2006/relationships" r:embed="rId5">
+            <a:extLst>
+              <a:ext uri="{96DAC541-7B7A-43D3-8B79-37D633B846F1}">
+                <asvg:svgBlip xmlns:asvg="http://schemas.microsoft.com/office/drawing/2016/SVG/main" r:embed="rId6"/>
+              </a:ext>
+            </a:extLst>
+          </a:blip>
+          <a:srcRect/>
+          <a:stretch>
+            <a:fillRect/>
+          </a:stretch>
+        </a:blipFill>
+      </dgm:spPr>
+      <dgm:extLst>
+        <a:ext uri="{E40237B7-FDA0-4F09-8148-C483321AD2D9}">
+          <dgm14:cNvPr xmlns:dgm14="http://schemas.microsoft.com/office/drawing/2010/diagram" id="0" name="" descr="Puzzleteile Silhouette"/>
+        </a:ext>
+      </dgm:extLst>
+    </dgm:pt>
+    <dgm:pt modelId="{1EC8CF91-AFFF-4E1F-92D3-FE691CF34180}" type="pres">
+      <dgm:prSet presAssocID="{293DF046-A1C7-403F-8791-2CCC2F7F3863}" presName="spaceRect" presStyleCnt="0"/>
+      <dgm:spPr/>
+    </dgm:pt>
+    <dgm:pt modelId="{44DDFBB6-6435-44C8-AED0-132AF8E1DF1D}" type="pres">
+      <dgm:prSet presAssocID="{293DF046-A1C7-403F-8791-2CCC2F7F3863}" presName="textRect" presStyleLbl="revTx" presStyleIdx="2" presStyleCnt="3">
+        <dgm:presLayoutVars>
+          <dgm:chMax val="1"/>
+          <dgm:chPref val="1"/>
+        </dgm:presLayoutVars>
+      </dgm:prSet>
+      <dgm:spPr/>
+    </dgm:pt>
+  </dgm:ptLst>
+  <dgm:cxnLst>
+    <dgm:cxn modelId="{920B9828-596D-4112-B276-CC63DAC4F895}" type="presOf" srcId="{26D5102E-056D-4D72-A046-B085B7E88976}" destId="{51BB67F4-A4F5-455D-9EBF-83B31106AAFD}" srcOrd="0" destOrd="0" presId="urn:microsoft.com/office/officeart/2018/2/layout/IconLabelList"/>
+    <dgm:cxn modelId="{E8AB2F2E-E973-4C0A-A19C-9CF23414FF24}" srcId="{119D1B9D-93FA-4EAB-AA15-31F9764A1702}" destId="{26D5102E-056D-4D72-A046-B085B7E88976}" srcOrd="0" destOrd="0" parTransId="{F81B2171-7BBD-469C-BC55-FA99E147D069}" sibTransId="{688F1B4E-D05A-4B98-98EC-C40DB77A9AE5}"/>
+    <dgm:cxn modelId="{F6576D33-55BE-4B8F-8367-CFCE62422862}" srcId="{119D1B9D-93FA-4EAB-AA15-31F9764A1702}" destId="{AC73764E-6681-48FF-8E3C-7F16EC36959D}" srcOrd="1" destOrd="0" parTransId="{3B8B8292-03FC-49C8-B1C2-BC4E98057A0C}" sibTransId="{86BFC2BA-703F-423E-9E45-38DE60DB4480}"/>
+    <dgm:cxn modelId="{91B7C146-3602-4938-B60E-56B031E3AA3A}" type="presOf" srcId="{119D1B9D-93FA-4EAB-AA15-31F9764A1702}" destId="{78E9406E-CF16-4E22-9E8D-4056EFEB6E16}" srcOrd="0" destOrd="0" presId="urn:microsoft.com/office/officeart/2018/2/layout/IconLabelList"/>
+    <dgm:cxn modelId="{162BE383-DEAC-498F-BE54-FB253515AB86}" srcId="{119D1B9D-93FA-4EAB-AA15-31F9764A1702}" destId="{293DF046-A1C7-403F-8791-2CCC2F7F3863}" srcOrd="2" destOrd="0" parTransId="{03A23492-4F21-49A8-8D62-ABA762391ABB}" sibTransId="{4150777F-0FE9-4FAA-B800-6737A6E2F61A}"/>
+    <dgm:cxn modelId="{B778E6A8-B04E-448E-8A9A-008F7EFD039C}" type="presOf" srcId="{AC73764E-6681-48FF-8E3C-7F16EC36959D}" destId="{AC622F39-56A1-43AC-9AC9-D73AA1DE56F9}" srcOrd="0" destOrd="0" presId="urn:microsoft.com/office/officeart/2018/2/layout/IconLabelList"/>
+    <dgm:cxn modelId="{D7E727B1-0297-4A94-8DC0-08B617BF8432}" type="presOf" srcId="{293DF046-A1C7-403F-8791-2CCC2F7F3863}" destId="{44DDFBB6-6435-44C8-AED0-132AF8E1DF1D}" srcOrd="0" destOrd="0" presId="urn:microsoft.com/office/officeart/2018/2/layout/IconLabelList"/>
+    <dgm:cxn modelId="{F7D8BD4C-7AA3-4D16-9BD3-C5ABBE68FE16}" type="presParOf" srcId="{78E9406E-CF16-4E22-9E8D-4056EFEB6E16}" destId="{394AAD79-864C-48A0-9F3F-320BAFA33D82}" srcOrd="0" destOrd="0" presId="urn:microsoft.com/office/officeart/2018/2/layout/IconLabelList"/>
+    <dgm:cxn modelId="{86833E11-804D-4EBB-8569-45FA00B62356}" type="presParOf" srcId="{394AAD79-864C-48A0-9F3F-320BAFA33D82}" destId="{43D2D36A-E1FF-49B6-9AD1-A6C0D3213F6E}" srcOrd="0" destOrd="0" presId="urn:microsoft.com/office/officeart/2018/2/layout/IconLabelList"/>
+    <dgm:cxn modelId="{04AFECBB-4D60-4EA5-BA37-4D6E502B6165}" type="presParOf" srcId="{394AAD79-864C-48A0-9F3F-320BAFA33D82}" destId="{5E293013-3226-403E-9551-455E1659A6DC}" srcOrd="1" destOrd="0" presId="urn:microsoft.com/office/officeart/2018/2/layout/IconLabelList"/>
+    <dgm:cxn modelId="{88CD177D-CD21-4B6E-8857-AFFAA153F7AC}" type="presParOf" srcId="{394AAD79-864C-48A0-9F3F-320BAFA33D82}" destId="{51BB67F4-A4F5-455D-9EBF-83B31106AAFD}" srcOrd="2" destOrd="0" presId="urn:microsoft.com/office/officeart/2018/2/layout/IconLabelList"/>
+    <dgm:cxn modelId="{550CAB9A-25C2-4636-B4BC-3594F670B245}" type="presParOf" srcId="{78E9406E-CF16-4E22-9E8D-4056EFEB6E16}" destId="{ED0350B0-88CA-4E11-A527-CB853DD63903}" srcOrd="1" destOrd="0" presId="urn:microsoft.com/office/officeart/2018/2/layout/IconLabelList"/>
+    <dgm:cxn modelId="{7A5714BD-21D7-4234-BAE8-7700455981D0}" type="presParOf" srcId="{78E9406E-CF16-4E22-9E8D-4056EFEB6E16}" destId="{E0A1EFD2-489F-4CF7-8E94-1A47140B84F9}" srcOrd="2" destOrd="0" presId="urn:microsoft.com/office/officeart/2018/2/layout/IconLabelList"/>
+    <dgm:cxn modelId="{03B03CD4-0E69-4726-8532-6275BD9873EA}" type="presParOf" srcId="{E0A1EFD2-489F-4CF7-8E94-1A47140B84F9}" destId="{A23150EC-9444-43C1-95E6-4ADDC2BCD192}" srcOrd="0" destOrd="0" presId="urn:microsoft.com/office/officeart/2018/2/layout/IconLabelList"/>
+    <dgm:cxn modelId="{7CA9A8BE-9F06-4194-8021-300E21829DCB}" type="presParOf" srcId="{E0A1EFD2-489F-4CF7-8E94-1A47140B84F9}" destId="{142FDFE1-88DF-46FF-9085-081EE57057B8}" srcOrd="1" destOrd="0" presId="urn:microsoft.com/office/officeart/2018/2/layout/IconLabelList"/>
+    <dgm:cxn modelId="{0286395F-C5E2-4323-B386-49BA3576F8E2}" type="presParOf" srcId="{E0A1EFD2-489F-4CF7-8E94-1A47140B84F9}" destId="{AC622F39-56A1-43AC-9AC9-D73AA1DE56F9}" srcOrd="2" destOrd="0" presId="urn:microsoft.com/office/officeart/2018/2/layout/IconLabelList"/>
+    <dgm:cxn modelId="{2FA82BFB-FF81-466B-8293-2903802B0B63}" type="presParOf" srcId="{78E9406E-CF16-4E22-9E8D-4056EFEB6E16}" destId="{FC56F260-4888-4156-B4E1-D3C56FD6C323}" srcOrd="3" destOrd="0" presId="urn:microsoft.com/office/officeart/2018/2/layout/IconLabelList"/>
+    <dgm:cxn modelId="{4081EEF5-3E29-4BF3-87D1-A37B0A74205D}" type="presParOf" srcId="{78E9406E-CF16-4E22-9E8D-4056EFEB6E16}" destId="{64407DE2-0526-40C5-8B93-37FD6A2775A7}" srcOrd="4" destOrd="0" presId="urn:microsoft.com/office/officeart/2018/2/layout/IconLabelList"/>
+    <dgm:cxn modelId="{73997678-00E4-4C9C-81C6-F6FF6AB76547}" type="presParOf" srcId="{64407DE2-0526-40C5-8B93-37FD6A2775A7}" destId="{E2A27A26-0FBE-4566-A2FD-3E494E2F285D}" srcOrd="0" destOrd="0" presId="urn:microsoft.com/office/officeart/2018/2/layout/IconLabelList"/>
+    <dgm:cxn modelId="{31F89990-34CF-4DBE-8485-CAD36FEBC09E}" type="presParOf" srcId="{64407DE2-0526-40C5-8B93-37FD6A2775A7}" destId="{1EC8CF91-AFFF-4E1F-92D3-FE691CF34180}" srcOrd="1" destOrd="0" presId="urn:microsoft.com/office/officeart/2018/2/layout/IconLabelList"/>
+    <dgm:cxn modelId="{6F300E26-7883-4637-9933-F08E79D85C37}" type="presParOf" srcId="{64407DE2-0526-40C5-8B93-37FD6A2775A7}" destId="{44DDFBB6-6435-44C8-AED0-132AF8E1DF1D}" srcOrd="2" destOrd="0" presId="urn:microsoft.com/office/officeart/2018/2/layout/IconLabelList"/>
   </dgm:cxnLst>
   <dgm:bg/>
   <dgm:whole/>
@@ -1770,6 +3004,370 @@
 </dsp:drawing>
 </file>
 
+<file path=ppt/diagrams/drawing2.xml><?xml version="1.0" encoding="utf-8"?>
+<dsp:drawing xmlns:dgm="http://schemas.openxmlformats.org/drawingml/2006/diagram" xmlns:dsp="http://schemas.microsoft.com/office/drawing/2008/diagram" xmlns:a="http://schemas.openxmlformats.org/drawingml/2006/main">
+  <dsp:spTree>
+    <dsp:nvGrpSpPr>
+      <dsp:cNvPr id="0" name=""/>
+      <dsp:cNvGrpSpPr/>
+    </dsp:nvGrpSpPr>
+    <dsp:grpSpPr/>
+    <dsp:sp modelId="{43D2D36A-E1FF-49B6-9AD1-A6C0D3213F6E}">
+      <dsp:nvSpPr>
+        <dsp:cNvPr id="0" name=""/>
+        <dsp:cNvSpPr/>
+      </dsp:nvSpPr>
+      <dsp:spPr>
+        <a:xfrm>
+          <a:off x="971210" y="806499"/>
+          <a:ext cx="1457802" cy="1457802"/>
+        </a:xfrm>
+        <a:prstGeom prst="rect">
+          <a:avLst/>
+        </a:prstGeom>
+        <a:blipFill>
+          <a:blip xmlns:r="http://schemas.openxmlformats.org/officeDocument/2006/relationships" r:embed="rId1">
+            <a:extLst>
+              <a:ext uri="{28A0092B-C50C-407E-A947-70E740481C1C}">
+                <a14:useLocalDpi xmlns:a14="http://schemas.microsoft.com/office/drawing/2010/main" val="0"/>
+              </a:ext>
+              <a:ext uri="{96DAC541-7B7A-43D3-8B79-37D633B846F1}">
+                <asvg:svgBlip xmlns:asvg="http://schemas.microsoft.com/office/drawing/2016/SVG/main" r:embed="rId2"/>
+              </a:ext>
+            </a:extLst>
+          </a:blip>
+          <a:stretch>
+            <a:fillRect/>
+          </a:stretch>
+        </a:blipFill>
+        <a:ln w="12700" cap="flat" cmpd="sng" algn="ctr">
+          <a:solidFill>
+            <a:schemeClr val="lt1">
+              <a:hueOff val="0"/>
+              <a:satOff val="0"/>
+              <a:lumOff val="0"/>
+              <a:alphaOff val="0"/>
+            </a:schemeClr>
+          </a:solidFill>
+          <a:prstDash val="solid"/>
+          <a:miter lim="800000"/>
+        </a:ln>
+        <a:effectLst/>
+      </dsp:spPr>
+      <dsp:style>
+        <a:lnRef idx="2">
+          <a:scrgbClr r="0" g="0" b="0"/>
+        </a:lnRef>
+        <a:fillRef idx="1">
+          <a:scrgbClr r="0" g="0" b="0"/>
+        </a:fillRef>
+        <a:effectRef idx="0">
+          <a:scrgbClr r="0" g="0" b="0"/>
+        </a:effectRef>
+        <a:fontRef idx="minor">
+          <a:schemeClr val="lt1"/>
+        </a:fontRef>
+      </dsp:style>
+    </dsp:sp>
+    <dsp:sp modelId="{51BB67F4-A4F5-455D-9EBF-83B31106AAFD}">
+      <dsp:nvSpPr>
+        <dsp:cNvPr id="0" name=""/>
+        <dsp:cNvSpPr/>
+      </dsp:nvSpPr>
+      <dsp:spPr>
+        <a:xfrm>
+          <a:off x="80331" y="2648625"/>
+          <a:ext cx="3239561" cy="720000"/>
+        </a:xfrm>
+        <a:prstGeom prst="rect">
+          <a:avLst/>
+        </a:prstGeom>
+        <a:noFill/>
+        <a:ln>
+          <a:noFill/>
+        </a:ln>
+        <a:effectLst/>
+      </dsp:spPr>
+      <dsp:style>
+        <a:lnRef idx="0">
+          <a:scrgbClr r="0" g="0" b="0"/>
+        </a:lnRef>
+        <a:fillRef idx="0">
+          <a:scrgbClr r="0" g="0" b="0"/>
+        </a:fillRef>
+        <a:effectRef idx="0">
+          <a:scrgbClr r="0" g="0" b="0"/>
+        </a:effectRef>
+        <a:fontRef idx="minor"/>
+      </dsp:style>
+      <dsp:txBody>
+        <a:bodyPr spcFirstLastPara="0" vert="horz" wrap="square" lIns="0" tIns="0" rIns="0" bIns="0" numCol="1" spcCol="1270" anchor="t" anchorCtr="0">
+          <a:noAutofit/>
+        </a:bodyPr>
+        <a:lstStyle/>
+        <a:p>
+          <a:pPr marL="0" lvl="0" indent="0" algn="ctr" defTabSz="1066800">
+            <a:lnSpc>
+              <a:spcPct val="100000"/>
+            </a:lnSpc>
+            <a:spcBef>
+              <a:spcPct val="0"/>
+            </a:spcBef>
+            <a:spcAft>
+              <a:spcPct val="35000"/>
+            </a:spcAft>
+            <a:buNone/>
+          </a:pPr>
+          <a:r>
+            <a:rPr lang="de-CH" sz="2400" kern="1200"/>
+            <a:t>Leverage what you already know</a:t>
+          </a:r>
+          <a:endParaRPr lang="en-US" sz="2400" kern="1200"/>
+        </a:p>
+      </dsp:txBody>
+      <dsp:txXfrm>
+        <a:off x="80331" y="2648625"/>
+        <a:ext cx="3239561" cy="720000"/>
+      </dsp:txXfrm>
+    </dsp:sp>
+    <dsp:sp modelId="{A23150EC-9444-43C1-95E6-4ADDC2BCD192}">
+      <dsp:nvSpPr>
+        <dsp:cNvPr id="0" name=""/>
+        <dsp:cNvSpPr/>
+      </dsp:nvSpPr>
+      <dsp:spPr>
+        <a:xfrm>
+          <a:off x="4777695" y="806499"/>
+          <a:ext cx="1457802" cy="1457802"/>
+        </a:xfrm>
+        <a:prstGeom prst="rect">
+          <a:avLst/>
+        </a:prstGeom>
+        <a:blipFill>
+          <a:blip xmlns:r="http://schemas.openxmlformats.org/officeDocument/2006/relationships" r:embed="rId3">
+            <a:extLst>
+              <a:ext uri="{28A0092B-C50C-407E-A947-70E740481C1C}">
+                <a14:useLocalDpi xmlns:a14="http://schemas.microsoft.com/office/drawing/2010/main" val="0"/>
+              </a:ext>
+              <a:ext uri="{96DAC541-7B7A-43D3-8B79-37D633B846F1}">
+                <asvg:svgBlip xmlns:asvg="http://schemas.microsoft.com/office/drawing/2016/SVG/main" r:embed="rId4"/>
+              </a:ext>
+            </a:extLst>
+          </a:blip>
+          <a:stretch>
+            <a:fillRect/>
+          </a:stretch>
+        </a:blipFill>
+        <a:ln w="12700" cap="flat" cmpd="sng" algn="ctr">
+          <a:solidFill>
+            <a:schemeClr val="lt1">
+              <a:hueOff val="0"/>
+              <a:satOff val="0"/>
+              <a:lumOff val="0"/>
+              <a:alphaOff val="0"/>
+            </a:schemeClr>
+          </a:solidFill>
+          <a:prstDash val="solid"/>
+          <a:miter lim="800000"/>
+        </a:ln>
+        <a:effectLst/>
+      </dsp:spPr>
+      <dsp:style>
+        <a:lnRef idx="2">
+          <a:scrgbClr r="0" g="0" b="0"/>
+        </a:lnRef>
+        <a:fillRef idx="1">
+          <a:scrgbClr r="0" g="0" b="0"/>
+        </a:fillRef>
+        <a:effectRef idx="0">
+          <a:scrgbClr r="0" g="0" b="0"/>
+        </a:effectRef>
+        <a:fontRef idx="minor">
+          <a:schemeClr val="lt1"/>
+        </a:fontRef>
+      </dsp:style>
+    </dsp:sp>
+    <dsp:sp modelId="{AC622F39-56A1-43AC-9AC9-D73AA1DE56F9}">
+      <dsp:nvSpPr>
+        <dsp:cNvPr id="0" name=""/>
+        <dsp:cNvSpPr/>
+      </dsp:nvSpPr>
+      <dsp:spPr>
+        <a:xfrm>
+          <a:off x="3886815" y="2648625"/>
+          <a:ext cx="3239561" cy="720000"/>
+        </a:xfrm>
+        <a:prstGeom prst="rect">
+          <a:avLst/>
+        </a:prstGeom>
+        <a:noFill/>
+        <a:ln>
+          <a:noFill/>
+        </a:ln>
+        <a:effectLst/>
+      </dsp:spPr>
+      <dsp:style>
+        <a:lnRef idx="0">
+          <a:scrgbClr r="0" g="0" b="0"/>
+        </a:lnRef>
+        <a:fillRef idx="0">
+          <a:scrgbClr r="0" g="0" b="0"/>
+        </a:fillRef>
+        <a:effectRef idx="0">
+          <a:scrgbClr r="0" g="0" b="0"/>
+        </a:effectRef>
+        <a:fontRef idx="minor"/>
+      </dsp:style>
+      <dsp:txBody>
+        <a:bodyPr spcFirstLastPara="0" vert="horz" wrap="square" lIns="0" tIns="0" rIns="0" bIns="0" numCol="1" spcCol="1270" anchor="t" anchorCtr="0">
+          <a:noAutofit/>
+        </a:bodyPr>
+        <a:lstStyle/>
+        <a:p>
+          <a:pPr marL="0" lvl="0" indent="0" algn="ctr" defTabSz="1066800">
+            <a:lnSpc>
+              <a:spcPct val="100000"/>
+            </a:lnSpc>
+            <a:spcBef>
+              <a:spcPct val="0"/>
+            </a:spcBef>
+            <a:spcAft>
+              <a:spcPct val="35000"/>
+            </a:spcAft>
+            <a:buNone/>
+          </a:pPr>
+          <a:r>
+            <a:rPr lang="de-CH" sz="2400" kern="1200"/>
+            <a:t>Robots react to their environment </a:t>
+          </a:r>
+          <a:endParaRPr lang="en-US" sz="2400" kern="1200"/>
+        </a:p>
+      </dsp:txBody>
+      <dsp:txXfrm>
+        <a:off x="3886815" y="2648625"/>
+        <a:ext cx="3239561" cy="720000"/>
+      </dsp:txXfrm>
+    </dsp:sp>
+    <dsp:sp modelId="{E2A27A26-0FBE-4566-A2FD-3E494E2F285D}">
+      <dsp:nvSpPr>
+        <dsp:cNvPr id="0" name=""/>
+        <dsp:cNvSpPr/>
+      </dsp:nvSpPr>
+      <dsp:spPr>
+        <a:xfrm>
+          <a:off x="8584179" y="806499"/>
+          <a:ext cx="1457802" cy="1457802"/>
+        </a:xfrm>
+        <a:prstGeom prst="rect">
+          <a:avLst/>
+        </a:prstGeom>
+        <a:blipFill>
+          <a:blip xmlns:r="http://schemas.openxmlformats.org/officeDocument/2006/relationships" r:embed="rId5">
+            <a:extLst>
+              <a:ext uri="{96DAC541-7B7A-43D3-8B79-37D633B846F1}">
+                <asvg:svgBlip xmlns:asvg="http://schemas.microsoft.com/office/drawing/2016/SVG/main" r:embed="rId6"/>
+              </a:ext>
+            </a:extLst>
+          </a:blip>
+          <a:srcRect/>
+          <a:stretch>
+            <a:fillRect/>
+          </a:stretch>
+        </a:blipFill>
+        <a:ln w="12700" cap="flat" cmpd="sng" algn="ctr">
+          <a:solidFill>
+            <a:schemeClr val="lt1">
+              <a:hueOff val="0"/>
+              <a:satOff val="0"/>
+              <a:lumOff val="0"/>
+              <a:alphaOff val="0"/>
+            </a:schemeClr>
+          </a:solidFill>
+          <a:prstDash val="solid"/>
+          <a:miter lim="800000"/>
+        </a:ln>
+        <a:effectLst/>
+      </dsp:spPr>
+      <dsp:style>
+        <a:lnRef idx="2">
+          <a:scrgbClr r="0" g="0" b="0"/>
+        </a:lnRef>
+        <a:fillRef idx="1">
+          <a:scrgbClr r="0" g="0" b="0"/>
+        </a:fillRef>
+        <a:effectRef idx="0">
+          <a:scrgbClr r="0" g="0" b="0"/>
+        </a:effectRef>
+        <a:fontRef idx="minor">
+          <a:schemeClr val="lt1"/>
+        </a:fontRef>
+      </dsp:style>
+    </dsp:sp>
+    <dsp:sp modelId="{44DDFBB6-6435-44C8-AED0-132AF8E1DF1D}">
+      <dsp:nvSpPr>
+        <dsp:cNvPr id="0" name=""/>
+        <dsp:cNvSpPr/>
+      </dsp:nvSpPr>
+      <dsp:spPr>
+        <a:xfrm>
+          <a:off x="7693300" y="2648625"/>
+          <a:ext cx="3239561" cy="720000"/>
+        </a:xfrm>
+        <a:prstGeom prst="rect">
+          <a:avLst/>
+        </a:prstGeom>
+        <a:noFill/>
+        <a:ln>
+          <a:noFill/>
+        </a:ln>
+        <a:effectLst/>
+      </dsp:spPr>
+      <dsp:style>
+        <a:lnRef idx="0">
+          <a:scrgbClr r="0" g="0" b="0"/>
+        </a:lnRef>
+        <a:fillRef idx="0">
+          <a:scrgbClr r="0" g="0" b="0"/>
+        </a:fillRef>
+        <a:effectRef idx="0">
+          <a:scrgbClr r="0" g="0" b="0"/>
+        </a:effectRef>
+        <a:fontRef idx="minor"/>
+      </dsp:style>
+      <dsp:txBody>
+        <a:bodyPr spcFirstLastPara="0" vert="horz" wrap="square" lIns="0" tIns="0" rIns="0" bIns="0" numCol="1" spcCol="1270" anchor="t" anchorCtr="0">
+          <a:noAutofit/>
+        </a:bodyPr>
+        <a:lstStyle/>
+        <a:p>
+          <a:pPr marL="0" lvl="0" indent="0" algn="ctr" defTabSz="1066800">
+            <a:lnSpc>
+              <a:spcPct val="100000"/>
+            </a:lnSpc>
+            <a:spcBef>
+              <a:spcPct val="0"/>
+            </a:spcBef>
+            <a:spcAft>
+              <a:spcPct val="35000"/>
+            </a:spcAft>
+            <a:buNone/>
+          </a:pPr>
+          <a:r>
+            <a:rPr lang="de-CH" sz="2400" kern="1200"/>
+            <a:t>Test small, save big</a:t>
+          </a:r>
+          <a:endParaRPr lang="en-US" sz="2400" kern="1200"/>
+        </a:p>
+      </dsp:txBody>
+      <dsp:txXfrm>
+        <a:off x="7693300" y="2648625"/>
+        <a:ext cx="3239561" cy="720000"/>
+      </dsp:txXfrm>
+    </dsp:sp>
+  </dsp:spTree>
+</dsp:drawing>
+</file>
+
 <file path=ppt/diagrams/layout1.xml><?xml version="1.0" encoding="utf-8"?>
 <dgm:layoutDef xmlns:dgm="http://schemas.openxmlformats.org/drawingml/2006/diagram" xmlns:a="http://schemas.openxmlformats.org/drawingml/2006/main" uniqueId="urn:microsoft.com/office/officeart/2018/2/layout/IconLabelList">
   <dgm:title val="Icon Label List"/>
@@ -1960,7 +3558,1231 @@
 </dgm:layoutDef>
 </file>
 
+<file path=ppt/diagrams/layout2.xml><?xml version="1.0" encoding="utf-8"?>
+<dgm:layoutDef xmlns:dgm="http://schemas.openxmlformats.org/drawingml/2006/diagram" xmlns:a="http://schemas.openxmlformats.org/drawingml/2006/main" uniqueId="urn:microsoft.com/office/officeart/2018/2/layout/IconLabelList">
+  <dgm:title val="Icon Label List"/>
+  <dgm:desc val="Use to show non-sequential or grouped chunks of information accompanied by a related visuals. Works best with icons or small pictures with short text captions."/>
+  <dgm:catLst>
+    <dgm:cat type="icon" pri="500"/>
+  </dgm:catLst>
+  <dgm:sampData useDef="1">
+    <dgm:dataModel>
+      <dgm:ptLst/>
+      <dgm:bg/>
+      <dgm:whole/>
+    </dgm:dataModel>
+  </dgm:sampData>
+  <dgm:styleData useDef="1">
+    <dgm:dataModel>
+      <dgm:ptLst/>
+      <dgm:bg/>
+      <dgm:whole/>
+    </dgm:dataModel>
+  </dgm:styleData>
+  <dgm:clrData useDef="1">
+    <dgm:dataModel>
+      <dgm:ptLst/>
+      <dgm:bg/>
+      <dgm:whole/>
+    </dgm:dataModel>
+  </dgm:clrData>
+  <dgm:layoutNode name="root">
+    <dgm:varLst>
+      <dgm:dir/>
+      <dgm:resizeHandles val="exact"/>
+    </dgm:varLst>
+    <dgm:choose name="Name0">
+      <dgm:if name="Name1" axis="self" func="var" arg="dir" op="equ" val="norm">
+        <dgm:alg type="snake">
+          <dgm:param type="grDir" val="tL"/>
+          <dgm:param type="flowDir" val="row"/>
+          <dgm:param type="contDir" val="sameDir"/>
+          <dgm:param type="off" val="ctr"/>
+          <dgm:param type="vertAlign" val="mid"/>
+          <dgm:param type="horzAlign" val="ctr"/>
+        </dgm:alg>
+      </dgm:if>
+      <dgm:else name="Name2">
+        <dgm:alg type="snake">
+          <dgm:param type="grDir" val="tR"/>
+          <dgm:param type="flowDir" val="row"/>
+          <dgm:param type="contDir" val="sameDir"/>
+          <dgm:param type="off" val="ctr"/>
+          <dgm:param type="vertAlign" val="mid"/>
+          <dgm:param type="horzAlign" val="ctr"/>
+        </dgm:alg>
+      </dgm:else>
+    </dgm:choose>
+    <dgm:shape xmlns:r="http://schemas.openxmlformats.org/officeDocument/2006/relationships" r:blip="">
+      <dgm:adjLst/>
+    </dgm:shape>
+    <dgm:presOf/>
+    <dgm:choose name="Name3">
+      <dgm:if name="Name4" axis="ch" ptType="node" func="cnt" op="lte" val="2">
+        <dgm:constrLst>
+          <dgm:constr type="h" for="ch" forName="compNode" refType="h" fact="0.4"/>
+          <dgm:constr type="w" for="ch" forName="compNode" val="120"/>
+          <dgm:constr type="w" for="ch" forName="sibTrans" refType="w" refFor="ch" refForName="compNode" fact="0.175"/>
+          <dgm:constr type="sp" refType="w" refFor="ch" refForName="compNode" op="equ" fact="0.25"/>
+          <dgm:constr type="primFontSz" for="des" ptType="node" op="equ" val="50"/>
+          <dgm:constr type="h" for="des" forName="compNode" op="equ"/>
+          <dgm:constr type="h" for="des" forName="textRect" op="equ"/>
+        </dgm:constrLst>
+      </dgm:if>
+      <dgm:if name="Name5" axis="ch" ptType="node" func="cnt" op="lte" val="4">
+        <dgm:constrLst>
+          <dgm:constr type="h" for="ch" forName="compNode" refType="h" fact="0.4"/>
+          <dgm:constr type="w" for="ch" forName="compNode" refType="w"/>
+          <dgm:constr type="w" for="ch" forName="sibTrans" refType="w" refFor="ch" refForName="compNode" fact="0.175"/>
+          <dgm:constr type="sp" refType="w" refFor="ch" refForName="compNode" op="equ" fact="0.25"/>
+          <dgm:constr type="primFontSz" for="des" ptType="node" op="equ" val="36"/>
+          <dgm:constr type="h" for="des" forName="compNode" op="equ"/>
+          <dgm:constr type="h" for="des" forName="textRect" op="equ"/>
+        </dgm:constrLst>
+      </dgm:if>
+      <dgm:else name="Name6">
+        <dgm:constrLst>
+          <dgm:constr type="h" for="ch" forName="compNode" refType="h" fact="0.4"/>
+          <dgm:constr type="w" for="ch" forName="compNode" refType="w"/>
+          <dgm:constr type="w" for="ch" forName="sibTrans" refType="w" refFor="ch" refForName="compNode" fact="0.175"/>
+          <dgm:constr type="sp" refType="w" refFor="ch" refForName="compNode" op="equ" fact="0.25"/>
+          <dgm:constr type="primFontSz" for="des" ptType="node" op="equ" val="24"/>
+          <dgm:constr type="h" for="des" forName="compNode" op="equ"/>
+          <dgm:constr type="h" for="des" forName="textRect" op="equ"/>
+        </dgm:constrLst>
+      </dgm:else>
+    </dgm:choose>
+    <dgm:ruleLst>
+      <dgm:rule type="w" for="ch" forName="compNode" val="50" fact="NaN" max="NaN"/>
+    </dgm:ruleLst>
+    <dgm:forEach name="Name7" axis="ch" ptType="node">
+      <dgm:layoutNode name="compNode">
+        <dgm:alg type="composite"/>
+        <dgm:shape xmlns:r="http://schemas.openxmlformats.org/officeDocument/2006/relationships" r:blip="">
+          <dgm:adjLst/>
+        </dgm:shape>
+        <dgm:presOf axis="self"/>
+        <dgm:constrLst>
+          <dgm:constr type="w" for="ch" forName="iconRect" refType="w" fact="0.45"/>
+          <dgm:constr type="h" for="ch" forName="iconRect" refType="w" refFor="ch" refForName="iconRect"/>
+          <dgm:constr type="ctrX" for="ch" forName="iconRect" refType="w" fact="0.5"/>
+          <dgm:constr type="t" for="ch" forName="iconRect"/>
+          <dgm:constr type="h" for="ch" forName="spaceRect" refType="h" fact="0.15"/>
+          <dgm:constr type="w" for="ch" forName="spaceRect" refType="w"/>
+          <dgm:constr type="l" for="ch" forName="spaceRect"/>
+          <dgm:constr type="t" for="ch" forName="spaceRect" refType="b" refFor="ch" refForName="iconRect"/>
+          <dgm:constr type="h" for="ch" forName="textRect" val="20"/>
+          <dgm:constr type="w" for="ch" forName="textRect" refType="w"/>
+          <dgm:constr type="l" for="ch" forName="textRect"/>
+          <dgm:constr type="t" for="ch" forName="textRect" refType="b" refFor="ch" refForName="spaceRect"/>
+        </dgm:constrLst>
+        <dgm:ruleLst>
+          <dgm:rule type="h" val="INF" fact="NaN" max="NaN"/>
+        </dgm:ruleLst>
+        <dgm:layoutNode name="iconRect" styleLbl="node1">
+          <dgm:alg type="sp"/>
+          <dgm:shape xmlns:r="http://schemas.openxmlformats.org/officeDocument/2006/relationships" type="rect" r:blip="" blipPhldr="1">
+            <dgm:adjLst/>
+          </dgm:shape>
+          <dgm:presOf/>
+          <dgm:constrLst/>
+          <dgm:ruleLst/>
+        </dgm:layoutNode>
+        <dgm:layoutNode name="spaceRect">
+          <dgm:alg type="sp"/>
+          <dgm:shape xmlns:r="http://schemas.openxmlformats.org/officeDocument/2006/relationships" r:blip="">
+            <dgm:adjLst/>
+          </dgm:shape>
+          <dgm:presOf/>
+          <dgm:constrLst/>
+          <dgm:ruleLst/>
+        </dgm:layoutNode>
+        <dgm:layoutNode name="textRect" styleLbl="revTx">
+          <dgm:varLst>
+            <dgm:chMax val="1"/>
+            <dgm:chPref val="1"/>
+          </dgm:varLst>
+          <dgm:alg type="tx">
+            <dgm:param type="txAnchorVert" val="t"/>
+          </dgm:alg>
+          <dgm:shape xmlns:r="http://schemas.openxmlformats.org/officeDocument/2006/relationships" type="rect" r:blip="">
+            <dgm:adjLst/>
+          </dgm:shape>
+          <dgm:presOf axis="self" ptType="node"/>
+          <dgm:constrLst>
+            <dgm:constr type="lMarg"/>
+            <dgm:constr type="rMarg"/>
+            <dgm:constr type="tMarg"/>
+            <dgm:constr type="bMarg"/>
+          </dgm:constrLst>
+          <dgm:ruleLst>
+            <dgm:rule type="primFontSz" val="11" fact="NaN" max="NaN"/>
+            <dgm:rule type="h" val="INF" fact="NaN" max="NaN"/>
+          </dgm:ruleLst>
+        </dgm:layoutNode>
+      </dgm:layoutNode>
+      <dgm:forEach name="Name8" axis="followSib" ptType="sibTrans" cnt="1">
+        <dgm:layoutNode name="sibTrans">
+          <dgm:alg type="sp"/>
+          <dgm:shape xmlns:r="http://schemas.openxmlformats.org/officeDocument/2006/relationships" r:blip="">
+            <dgm:adjLst/>
+          </dgm:shape>
+          <dgm:presOf axis="self"/>
+          <dgm:constrLst/>
+          <dgm:ruleLst/>
+        </dgm:layoutNode>
+      </dgm:forEach>
+    </dgm:forEach>
+  </dgm:layoutNode>
+  <dgm:extLst>
+    <a:ext uri="{68A01E43-0DF5-4B5B-8FA6-DAF915123BFB}">
+      <dgm1612:lstStyle xmlns:dgm1612="http://schemas.microsoft.com/office/drawing/2016/12/diagram">
+        <a:lvl1pPr>
+          <a:lnSpc>
+            <a:spcPct val="100000"/>
+          </a:lnSpc>
+        </a:lvl1pPr>
+      </dgm1612:lstStyle>
+    </a:ext>
+  </dgm:extLst>
+</dgm:layoutDef>
+</file>
+
 <file path=ppt/diagrams/quickStyle1.xml><?xml version="1.0" encoding="utf-8"?>
+<dgm:styleDef xmlns:dgm="http://schemas.openxmlformats.org/drawingml/2006/diagram" xmlns:a="http://schemas.openxmlformats.org/drawingml/2006/main" uniqueId="urn:microsoft.com/office/officeart/2005/8/quickstyle/simple1">
+  <dgm:title val=""/>
+  <dgm:desc val=""/>
+  <dgm:catLst>
+    <dgm:cat type="simple" pri="10100"/>
+  </dgm:catLst>
+  <dgm:scene3d>
+    <a:camera prst="orthographicFront"/>
+    <a:lightRig rig="threePt" dir="t"/>
+  </dgm:scene3d>
+  <dgm:styleLbl name="node0">
+    <dgm:scene3d>
+      <a:camera prst="orthographicFront"/>
+      <a:lightRig rig="threePt" dir="t"/>
+    </dgm:scene3d>
+    <dgm:sp3d/>
+    <dgm:txPr/>
+    <dgm:style>
+      <a:lnRef idx="2">
+        <a:scrgbClr r="0" g="0" b="0"/>
+      </a:lnRef>
+      <a:fillRef idx="1">
+        <a:scrgbClr r="0" g="0" b="0"/>
+      </a:fillRef>
+      <a:effectRef idx="0">
+        <a:scrgbClr r="0" g="0" b="0"/>
+      </a:effectRef>
+      <a:fontRef idx="minor">
+        <a:schemeClr val="lt1"/>
+      </a:fontRef>
+    </dgm:style>
+  </dgm:styleLbl>
+  <dgm:styleLbl name="lnNode1">
+    <dgm:scene3d>
+      <a:camera prst="orthographicFront"/>
+      <a:lightRig rig="threePt" dir="t"/>
+    </dgm:scene3d>
+    <dgm:sp3d/>
+    <dgm:txPr/>
+    <dgm:style>
+      <a:lnRef idx="2">
+        <a:scrgbClr r="0" g="0" b="0"/>
+      </a:lnRef>
+      <a:fillRef idx="1">
+        <a:scrgbClr r="0" g="0" b="0"/>
+      </a:fillRef>
+      <a:effectRef idx="0">
+        <a:scrgbClr r="0" g="0" b="0"/>
+      </a:effectRef>
+      <a:fontRef idx="minor">
+        <a:schemeClr val="lt1"/>
+      </a:fontRef>
+    </dgm:style>
+  </dgm:styleLbl>
+  <dgm:styleLbl name="vennNode1">
+    <dgm:scene3d>
+      <a:camera prst="orthographicFront"/>
+      <a:lightRig rig="threePt" dir="t"/>
+    </dgm:scene3d>
+    <dgm:sp3d/>
+    <dgm:txPr/>
+    <dgm:style>
+      <a:lnRef idx="2">
+        <a:scrgbClr r="0" g="0" b="0"/>
+      </a:lnRef>
+      <a:fillRef idx="1">
+        <a:scrgbClr r="0" g="0" b="0"/>
+      </a:fillRef>
+      <a:effectRef idx="0">
+        <a:scrgbClr r="0" g="0" b="0"/>
+      </a:effectRef>
+      <a:fontRef idx="minor">
+        <a:schemeClr val="tx1"/>
+      </a:fontRef>
+    </dgm:style>
+  </dgm:styleLbl>
+  <dgm:styleLbl name="alignNode1">
+    <dgm:scene3d>
+      <a:camera prst="orthographicFront"/>
+      <a:lightRig rig="threePt" dir="t"/>
+    </dgm:scene3d>
+    <dgm:sp3d/>
+    <dgm:txPr/>
+    <dgm:style>
+      <a:lnRef idx="2">
+        <a:scrgbClr r="0" g="0" b="0"/>
+      </a:lnRef>
+      <a:fillRef idx="1">
+        <a:scrgbClr r="0" g="0" b="0"/>
+      </a:fillRef>
+      <a:effectRef idx="0">
+        <a:scrgbClr r="0" g="0" b="0"/>
+      </a:effectRef>
+      <a:fontRef idx="minor">
+        <a:schemeClr val="lt1"/>
+      </a:fontRef>
+    </dgm:style>
+  </dgm:styleLbl>
+  <dgm:styleLbl name="node1">
+    <dgm:scene3d>
+      <a:camera prst="orthographicFront"/>
+      <a:lightRig rig="threePt" dir="t"/>
+    </dgm:scene3d>
+    <dgm:sp3d/>
+    <dgm:txPr/>
+    <dgm:style>
+      <a:lnRef idx="2">
+        <a:scrgbClr r="0" g="0" b="0"/>
+      </a:lnRef>
+      <a:fillRef idx="1">
+        <a:scrgbClr r="0" g="0" b="0"/>
+      </a:fillRef>
+      <a:effectRef idx="0">
+        <a:scrgbClr r="0" g="0" b="0"/>
+      </a:effectRef>
+      <a:fontRef idx="minor">
+        <a:schemeClr val="lt1"/>
+      </a:fontRef>
+    </dgm:style>
+  </dgm:styleLbl>
+  <dgm:styleLbl name="node2">
+    <dgm:scene3d>
+      <a:camera prst="orthographicFront"/>
+      <a:lightRig rig="threePt" dir="t"/>
+    </dgm:scene3d>
+    <dgm:sp3d/>
+    <dgm:txPr/>
+    <dgm:style>
+      <a:lnRef idx="2">
+        <a:scrgbClr r="0" g="0" b="0"/>
+      </a:lnRef>
+      <a:fillRef idx="1">
+        <a:scrgbClr r="0" g="0" b="0"/>
+      </a:fillRef>
+      <a:effectRef idx="0">
+        <a:scrgbClr r="0" g="0" b="0"/>
+      </a:effectRef>
+      <a:fontRef idx="minor">
+        <a:schemeClr val="lt1"/>
+      </a:fontRef>
+    </dgm:style>
+  </dgm:styleLbl>
+  <dgm:styleLbl name="node3">
+    <dgm:scene3d>
+      <a:camera prst="orthographicFront"/>
+      <a:lightRig rig="threePt" dir="t"/>
+    </dgm:scene3d>
+    <dgm:sp3d/>
+    <dgm:txPr/>
+    <dgm:style>
+      <a:lnRef idx="2">
+        <a:scrgbClr r="0" g="0" b="0"/>
+      </a:lnRef>
+      <a:fillRef idx="1">
+        <a:scrgbClr r="0" g="0" b="0"/>
+      </a:fillRef>
+      <a:effectRef idx="0">
+        <a:scrgbClr r="0" g="0" b="0"/>
+      </a:effectRef>
+      <a:fontRef idx="minor">
+        <a:schemeClr val="lt1"/>
+      </a:fontRef>
+    </dgm:style>
+  </dgm:styleLbl>
+  <dgm:styleLbl name="node4">
+    <dgm:scene3d>
+      <a:camera prst="orthographicFront"/>
+      <a:lightRig rig="threePt" dir="t"/>
+    </dgm:scene3d>
+    <dgm:sp3d/>
+    <dgm:txPr/>
+    <dgm:style>
+      <a:lnRef idx="2">
+        <a:scrgbClr r="0" g="0" b="0"/>
+      </a:lnRef>
+      <a:fillRef idx="1">
+        <a:scrgbClr r="0" g="0" b="0"/>
+      </a:fillRef>
+      <a:effectRef idx="0">
+        <a:scrgbClr r="0" g="0" b="0"/>
+      </a:effectRef>
+      <a:fontRef idx="minor">
+        <a:schemeClr val="lt1"/>
+      </a:fontRef>
+    </dgm:style>
+  </dgm:styleLbl>
+  <dgm:styleLbl name="fgImgPlace1">
+    <dgm:scene3d>
+      <a:camera prst="orthographicFront"/>
+      <a:lightRig rig="threePt" dir="t"/>
+    </dgm:scene3d>
+    <dgm:sp3d/>
+    <dgm:txPr/>
+    <dgm:style>
+      <a:lnRef idx="2">
+        <a:scrgbClr r="0" g="0" b="0"/>
+      </a:lnRef>
+      <a:fillRef idx="1">
+        <a:scrgbClr r="0" g="0" b="0"/>
+      </a:fillRef>
+      <a:effectRef idx="0">
+        <a:scrgbClr r="0" g="0" b="0"/>
+      </a:effectRef>
+      <a:fontRef idx="minor"/>
+    </dgm:style>
+  </dgm:styleLbl>
+  <dgm:styleLbl name="alignImgPlace1">
+    <dgm:scene3d>
+      <a:camera prst="orthographicFront"/>
+      <a:lightRig rig="threePt" dir="t"/>
+    </dgm:scene3d>
+    <dgm:sp3d/>
+    <dgm:txPr/>
+    <dgm:style>
+      <a:lnRef idx="2">
+        <a:scrgbClr r="0" g="0" b="0"/>
+      </a:lnRef>
+      <a:fillRef idx="1">
+        <a:scrgbClr r="0" g="0" b="0"/>
+      </a:fillRef>
+      <a:effectRef idx="0">
+        <a:scrgbClr r="0" g="0" b="0"/>
+      </a:effectRef>
+      <a:fontRef idx="minor"/>
+    </dgm:style>
+  </dgm:styleLbl>
+  <dgm:styleLbl name="bgImgPlace1">
+    <dgm:scene3d>
+      <a:camera prst="orthographicFront"/>
+      <a:lightRig rig="threePt" dir="t"/>
+    </dgm:scene3d>
+    <dgm:sp3d/>
+    <dgm:txPr/>
+    <dgm:style>
+      <a:lnRef idx="2">
+        <a:scrgbClr r="0" g="0" b="0"/>
+      </a:lnRef>
+      <a:fillRef idx="1">
+        <a:scrgbClr r="0" g="0" b="0"/>
+      </a:fillRef>
+      <a:effectRef idx="0">
+        <a:scrgbClr r="0" g="0" b="0"/>
+      </a:effectRef>
+      <a:fontRef idx="minor"/>
+    </dgm:style>
+  </dgm:styleLbl>
+  <dgm:styleLbl name="sibTrans2D1">
+    <dgm:scene3d>
+      <a:camera prst="orthographicFront"/>
+      <a:lightRig rig="threePt" dir="t"/>
+    </dgm:scene3d>
+    <dgm:sp3d/>
+    <dgm:txPr/>
+    <dgm:style>
+      <a:lnRef idx="0">
+        <a:scrgbClr r="0" g="0" b="0"/>
+      </a:lnRef>
+      <a:fillRef idx="1">
+        <a:scrgbClr r="0" g="0" b="0"/>
+      </a:fillRef>
+      <a:effectRef idx="0">
+        <a:scrgbClr r="0" g="0" b="0"/>
+      </a:effectRef>
+      <a:fontRef idx="minor">
+        <a:schemeClr val="lt1"/>
+      </a:fontRef>
+    </dgm:style>
+  </dgm:styleLbl>
+  <dgm:styleLbl name="fgSibTrans2D1">
+    <dgm:scene3d>
+      <a:camera prst="orthographicFront"/>
+      <a:lightRig rig="threePt" dir="t"/>
+    </dgm:scene3d>
+    <dgm:sp3d/>
+    <dgm:txPr/>
+    <dgm:style>
+      <a:lnRef idx="0">
+        <a:scrgbClr r="0" g="0" b="0"/>
+      </a:lnRef>
+      <a:fillRef idx="1">
+        <a:scrgbClr r="0" g="0" b="0"/>
+      </a:fillRef>
+      <a:effectRef idx="0">
+        <a:scrgbClr r="0" g="0" b="0"/>
+      </a:effectRef>
+      <a:fontRef idx="minor">
+        <a:schemeClr val="lt1"/>
+      </a:fontRef>
+    </dgm:style>
+  </dgm:styleLbl>
+  <dgm:styleLbl name="bgSibTrans2D1">
+    <dgm:scene3d>
+      <a:camera prst="orthographicFront"/>
+      <a:lightRig rig="threePt" dir="t"/>
+    </dgm:scene3d>
+    <dgm:sp3d/>
+    <dgm:txPr/>
+    <dgm:style>
+      <a:lnRef idx="0">
+        <a:scrgbClr r="0" g="0" b="0"/>
+      </a:lnRef>
+      <a:fillRef idx="1">
+        <a:scrgbClr r="0" g="0" b="0"/>
+      </a:fillRef>
+      <a:effectRef idx="0">
+        <a:scrgbClr r="0" g="0" b="0"/>
+      </a:effectRef>
+      <a:fontRef idx="minor">
+        <a:schemeClr val="lt1"/>
+      </a:fontRef>
+    </dgm:style>
+  </dgm:styleLbl>
+  <dgm:styleLbl name="sibTrans1D1">
+    <dgm:scene3d>
+      <a:camera prst="orthographicFront"/>
+      <a:lightRig rig="threePt" dir="t"/>
+    </dgm:scene3d>
+    <dgm:sp3d/>
+    <dgm:txPr/>
+    <dgm:style>
+      <a:lnRef idx="1">
+        <a:scrgbClr r="0" g="0" b="0"/>
+      </a:lnRef>
+      <a:fillRef idx="0">
+        <a:scrgbClr r="0" g="0" b="0"/>
+      </a:fillRef>
+      <a:effectRef idx="0">
+        <a:scrgbClr r="0" g="0" b="0"/>
+      </a:effectRef>
+      <a:fontRef idx="minor"/>
+    </dgm:style>
+  </dgm:styleLbl>
+  <dgm:styleLbl name="callout">
+    <dgm:scene3d>
+      <a:camera prst="orthographicFront"/>
+      <a:lightRig rig="threePt" dir="t"/>
+    </dgm:scene3d>
+    <dgm:sp3d/>
+    <dgm:txPr/>
+    <dgm:style>
+      <a:lnRef idx="2">
+        <a:scrgbClr r="0" g="0" b="0"/>
+      </a:lnRef>
+      <a:fillRef idx="1">
+        <a:scrgbClr r="0" g="0" b="0"/>
+      </a:fillRef>
+      <a:effectRef idx="0">
+        <a:scrgbClr r="0" g="0" b="0"/>
+      </a:effectRef>
+      <a:fontRef idx="minor"/>
+    </dgm:style>
+  </dgm:styleLbl>
+  <dgm:styleLbl name="asst0">
+    <dgm:scene3d>
+      <a:camera prst="orthographicFront"/>
+      <a:lightRig rig="threePt" dir="t"/>
+    </dgm:scene3d>
+    <dgm:sp3d/>
+    <dgm:txPr/>
+    <dgm:style>
+      <a:lnRef idx="2">
+        <a:scrgbClr r="0" g="0" b="0"/>
+      </a:lnRef>
+      <a:fillRef idx="1">
+        <a:scrgbClr r="0" g="0" b="0"/>
+      </a:fillRef>
+      <a:effectRef idx="0">
+        <a:scrgbClr r="0" g="0" b="0"/>
+      </a:effectRef>
+      <a:fontRef idx="minor">
+        <a:schemeClr val="lt1"/>
+      </a:fontRef>
+    </dgm:style>
+  </dgm:styleLbl>
+  <dgm:styleLbl name="asst1">
+    <dgm:scene3d>
+      <a:camera prst="orthographicFront"/>
+      <a:lightRig rig="threePt" dir="t"/>
+    </dgm:scene3d>
+    <dgm:sp3d/>
+    <dgm:txPr/>
+    <dgm:style>
+      <a:lnRef idx="2">
+        <a:scrgbClr r="0" g="0" b="0"/>
+      </a:lnRef>
+      <a:fillRef idx="1">
+        <a:scrgbClr r="0" g="0" b="0"/>
+      </a:fillRef>
+      <a:effectRef idx="0">
+        <a:scrgbClr r="0" g="0" b="0"/>
+      </a:effectRef>
+      <a:fontRef idx="minor">
+        <a:schemeClr val="lt1"/>
+      </a:fontRef>
+    </dgm:style>
+  </dgm:styleLbl>
+  <dgm:styleLbl name="asst2">
+    <dgm:scene3d>
+      <a:camera prst="orthographicFront"/>
+      <a:lightRig rig="threePt" dir="t"/>
+    </dgm:scene3d>
+    <dgm:sp3d/>
+    <dgm:txPr/>
+    <dgm:style>
+      <a:lnRef idx="2">
+        <a:scrgbClr r="0" g="0" b="0"/>
+      </a:lnRef>
+      <a:fillRef idx="1">
+        <a:scrgbClr r="0" g="0" b="0"/>
+      </a:fillRef>
+      <a:effectRef idx="0">
+        <a:scrgbClr r="0" g="0" b="0"/>
+      </a:effectRef>
+      <a:fontRef idx="minor">
+        <a:schemeClr val="lt1"/>
+      </a:fontRef>
+    </dgm:style>
+  </dgm:styleLbl>
+  <dgm:styleLbl name="asst3">
+    <dgm:scene3d>
+      <a:camera prst="orthographicFront"/>
+      <a:lightRig rig="threePt" dir="t"/>
+    </dgm:scene3d>
+    <dgm:sp3d/>
+    <dgm:txPr/>
+    <dgm:style>
+      <a:lnRef idx="2">
+        <a:scrgbClr r="0" g="0" b="0"/>
+      </a:lnRef>
+      <a:fillRef idx="1">
+        <a:scrgbClr r="0" g="0" b="0"/>
+      </a:fillRef>
+      <a:effectRef idx="0">
+        <a:scrgbClr r="0" g="0" b="0"/>
+      </a:effectRef>
+      <a:fontRef idx="minor">
+        <a:schemeClr val="lt1"/>
+      </a:fontRef>
+    </dgm:style>
+  </dgm:styleLbl>
+  <dgm:styleLbl name="asst4">
+    <dgm:scene3d>
+      <a:camera prst="orthographicFront"/>
+      <a:lightRig rig="threePt" dir="t"/>
+    </dgm:scene3d>
+    <dgm:sp3d/>
+    <dgm:txPr/>
+    <dgm:style>
+      <a:lnRef idx="2">
+        <a:scrgbClr r="0" g="0" b="0"/>
+      </a:lnRef>
+      <a:fillRef idx="1">
+        <a:scrgbClr r="0" g="0" b="0"/>
+      </a:fillRef>
+      <a:effectRef idx="0">
+        <a:scrgbClr r="0" g="0" b="0"/>
+      </a:effectRef>
+      <a:fontRef idx="minor">
+        <a:schemeClr val="lt1"/>
+      </a:fontRef>
+    </dgm:style>
+  </dgm:styleLbl>
+  <dgm:styleLbl name="parChTrans2D1">
+    <dgm:scene3d>
+      <a:camera prst="orthographicFront"/>
+      <a:lightRig rig="threePt" dir="t"/>
+    </dgm:scene3d>
+    <dgm:sp3d/>
+    <dgm:txPr/>
+    <dgm:style>
+      <a:lnRef idx="2">
+        <a:scrgbClr r="0" g="0" b="0"/>
+      </a:lnRef>
+      <a:fillRef idx="1">
+        <a:scrgbClr r="0" g="0" b="0"/>
+      </a:fillRef>
+      <a:effectRef idx="0">
+        <a:scrgbClr r="0" g="0" b="0"/>
+      </a:effectRef>
+      <a:fontRef idx="minor">
+        <a:schemeClr val="lt1"/>
+      </a:fontRef>
+    </dgm:style>
+  </dgm:styleLbl>
+  <dgm:styleLbl name="parChTrans2D2">
+    <dgm:scene3d>
+      <a:camera prst="orthographicFront"/>
+      <a:lightRig rig="threePt" dir="t"/>
+    </dgm:scene3d>
+    <dgm:sp3d/>
+    <dgm:txPr/>
+    <dgm:style>
+      <a:lnRef idx="2">
+        <a:scrgbClr r="0" g="0" b="0"/>
+      </a:lnRef>
+      <a:fillRef idx="1">
+        <a:scrgbClr r="0" g="0" b="0"/>
+      </a:fillRef>
+      <a:effectRef idx="0">
+        <a:scrgbClr r="0" g="0" b="0"/>
+      </a:effectRef>
+      <a:fontRef idx="minor">
+        <a:schemeClr val="lt1"/>
+      </a:fontRef>
+    </dgm:style>
+  </dgm:styleLbl>
+  <dgm:styleLbl name="parChTrans2D3">
+    <dgm:scene3d>
+      <a:camera prst="orthographicFront"/>
+      <a:lightRig rig="threePt" dir="t"/>
+    </dgm:scene3d>
+    <dgm:sp3d/>
+    <dgm:txPr/>
+    <dgm:style>
+      <a:lnRef idx="2">
+        <a:scrgbClr r="0" g="0" b="0"/>
+      </a:lnRef>
+      <a:fillRef idx="1">
+        <a:scrgbClr r="0" g="0" b="0"/>
+      </a:fillRef>
+      <a:effectRef idx="0">
+        <a:scrgbClr r="0" g="0" b="0"/>
+      </a:effectRef>
+      <a:fontRef idx="minor">
+        <a:schemeClr val="lt1"/>
+      </a:fontRef>
+    </dgm:style>
+  </dgm:styleLbl>
+  <dgm:styleLbl name="parChTrans2D4">
+    <dgm:scene3d>
+      <a:camera prst="orthographicFront"/>
+      <a:lightRig rig="threePt" dir="t"/>
+    </dgm:scene3d>
+    <dgm:sp3d/>
+    <dgm:txPr/>
+    <dgm:style>
+      <a:lnRef idx="2">
+        <a:scrgbClr r="0" g="0" b="0"/>
+      </a:lnRef>
+      <a:fillRef idx="1">
+        <a:scrgbClr r="0" g="0" b="0"/>
+      </a:fillRef>
+      <a:effectRef idx="0">
+        <a:scrgbClr r="0" g="0" b="0"/>
+      </a:effectRef>
+      <a:fontRef idx="minor">
+        <a:schemeClr val="lt1"/>
+      </a:fontRef>
+    </dgm:style>
+  </dgm:styleLbl>
+  <dgm:styleLbl name="parChTrans1D1">
+    <dgm:scene3d>
+      <a:camera prst="orthographicFront"/>
+      <a:lightRig rig="threePt" dir="t"/>
+    </dgm:scene3d>
+    <dgm:sp3d/>
+    <dgm:txPr/>
+    <dgm:style>
+      <a:lnRef idx="2">
+        <a:scrgbClr r="0" g="0" b="0"/>
+      </a:lnRef>
+      <a:fillRef idx="0">
+        <a:scrgbClr r="0" g="0" b="0"/>
+      </a:fillRef>
+      <a:effectRef idx="0">
+        <a:scrgbClr r="0" g="0" b="0"/>
+      </a:effectRef>
+      <a:fontRef idx="minor"/>
+    </dgm:style>
+  </dgm:styleLbl>
+  <dgm:styleLbl name="parChTrans1D2">
+    <dgm:scene3d>
+      <a:camera prst="orthographicFront"/>
+      <a:lightRig rig="threePt" dir="t"/>
+    </dgm:scene3d>
+    <dgm:sp3d/>
+    <dgm:txPr/>
+    <dgm:style>
+      <a:lnRef idx="2">
+        <a:scrgbClr r="0" g="0" b="0"/>
+      </a:lnRef>
+      <a:fillRef idx="0">
+        <a:scrgbClr r="0" g="0" b="0"/>
+      </a:fillRef>
+      <a:effectRef idx="0">
+        <a:scrgbClr r="0" g="0" b="0"/>
+      </a:effectRef>
+      <a:fontRef idx="minor"/>
+    </dgm:style>
+  </dgm:styleLbl>
+  <dgm:styleLbl name="parChTrans1D3">
+    <dgm:scene3d>
+      <a:camera prst="orthographicFront"/>
+      <a:lightRig rig="threePt" dir="t"/>
+    </dgm:scene3d>
+    <dgm:sp3d/>
+    <dgm:txPr/>
+    <dgm:style>
+      <a:lnRef idx="2">
+        <a:scrgbClr r="0" g="0" b="0"/>
+      </a:lnRef>
+      <a:fillRef idx="0">
+        <a:scrgbClr r="0" g="0" b="0"/>
+      </a:fillRef>
+      <a:effectRef idx="0">
+        <a:scrgbClr r="0" g="0" b="0"/>
+      </a:effectRef>
+      <a:fontRef idx="minor"/>
+    </dgm:style>
+  </dgm:styleLbl>
+  <dgm:styleLbl name="parChTrans1D4">
+    <dgm:scene3d>
+      <a:camera prst="orthographicFront"/>
+      <a:lightRig rig="threePt" dir="t"/>
+    </dgm:scene3d>
+    <dgm:sp3d/>
+    <dgm:txPr/>
+    <dgm:style>
+      <a:lnRef idx="2">
+        <a:scrgbClr r="0" g="0" b="0"/>
+      </a:lnRef>
+      <a:fillRef idx="0">
+        <a:scrgbClr r="0" g="0" b="0"/>
+      </a:fillRef>
+      <a:effectRef idx="0">
+        <a:scrgbClr r="0" g="0" b="0"/>
+      </a:effectRef>
+      <a:fontRef idx="minor"/>
+    </dgm:style>
+  </dgm:styleLbl>
+  <dgm:styleLbl name="fgAcc1">
+    <dgm:scene3d>
+      <a:camera prst="orthographicFront"/>
+      <a:lightRig rig="threePt" dir="t"/>
+    </dgm:scene3d>
+    <dgm:sp3d/>
+    <dgm:txPr/>
+    <dgm:style>
+      <a:lnRef idx="2">
+        <a:scrgbClr r="0" g="0" b="0"/>
+      </a:lnRef>
+      <a:fillRef idx="1">
+        <a:scrgbClr r="0" g="0" b="0"/>
+      </a:fillRef>
+      <a:effectRef idx="0">
+        <a:scrgbClr r="0" g="0" b="0"/>
+      </a:effectRef>
+      <a:fontRef idx="minor"/>
+    </dgm:style>
+  </dgm:styleLbl>
+  <dgm:styleLbl name="conFgAcc1">
+    <dgm:scene3d>
+      <a:camera prst="orthographicFront"/>
+      <a:lightRig rig="threePt" dir="t"/>
+    </dgm:scene3d>
+    <dgm:sp3d/>
+    <dgm:txPr/>
+    <dgm:style>
+      <a:lnRef idx="2">
+        <a:scrgbClr r="0" g="0" b="0"/>
+      </a:lnRef>
+      <a:fillRef idx="1">
+        <a:scrgbClr r="0" g="0" b="0"/>
+      </a:fillRef>
+      <a:effectRef idx="0">
+        <a:scrgbClr r="0" g="0" b="0"/>
+      </a:effectRef>
+      <a:fontRef idx="minor"/>
+    </dgm:style>
+  </dgm:styleLbl>
+  <dgm:styleLbl name="alignAcc1">
+    <dgm:scene3d>
+      <a:camera prst="orthographicFront"/>
+      <a:lightRig rig="threePt" dir="t"/>
+    </dgm:scene3d>
+    <dgm:sp3d/>
+    <dgm:txPr/>
+    <dgm:style>
+      <a:lnRef idx="2">
+        <a:scrgbClr r="0" g="0" b="0"/>
+      </a:lnRef>
+      <a:fillRef idx="1">
+        <a:scrgbClr r="0" g="0" b="0"/>
+      </a:fillRef>
+      <a:effectRef idx="0">
+        <a:scrgbClr r="0" g="0" b="0"/>
+      </a:effectRef>
+      <a:fontRef idx="minor"/>
+    </dgm:style>
+  </dgm:styleLbl>
+  <dgm:styleLbl name="trAlignAcc1">
+    <dgm:scene3d>
+      <a:camera prst="orthographicFront"/>
+      <a:lightRig rig="threePt" dir="t"/>
+    </dgm:scene3d>
+    <dgm:sp3d/>
+    <dgm:txPr/>
+    <dgm:style>
+      <a:lnRef idx="1">
+        <a:scrgbClr r="0" g="0" b="0"/>
+      </a:lnRef>
+      <a:fillRef idx="1">
+        <a:scrgbClr r="0" g="0" b="0"/>
+      </a:fillRef>
+      <a:effectRef idx="0">
+        <a:scrgbClr r="0" g="0" b="0"/>
+      </a:effectRef>
+      <a:fontRef idx="minor"/>
+    </dgm:style>
+  </dgm:styleLbl>
+  <dgm:styleLbl name="bgAcc1">
+    <dgm:scene3d>
+      <a:camera prst="orthographicFront"/>
+      <a:lightRig rig="threePt" dir="t"/>
+    </dgm:scene3d>
+    <dgm:sp3d/>
+    <dgm:txPr/>
+    <dgm:style>
+      <a:lnRef idx="2">
+        <a:scrgbClr r="0" g="0" b="0"/>
+      </a:lnRef>
+      <a:fillRef idx="1">
+        <a:scrgbClr r="0" g="0" b="0"/>
+      </a:fillRef>
+      <a:effectRef idx="0">
+        <a:scrgbClr r="0" g="0" b="0"/>
+      </a:effectRef>
+      <a:fontRef idx="minor"/>
+    </dgm:style>
+  </dgm:styleLbl>
+  <dgm:styleLbl name="solidFgAcc1">
+    <dgm:scene3d>
+      <a:camera prst="orthographicFront"/>
+      <a:lightRig rig="threePt" dir="t"/>
+    </dgm:scene3d>
+    <dgm:sp3d/>
+    <dgm:txPr/>
+    <dgm:style>
+      <a:lnRef idx="2">
+        <a:scrgbClr r="0" g="0" b="0"/>
+      </a:lnRef>
+      <a:fillRef idx="1">
+        <a:scrgbClr r="0" g="0" b="0"/>
+      </a:fillRef>
+      <a:effectRef idx="0">
+        <a:scrgbClr r="0" g="0" b="0"/>
+      </a:effectRef>
+      <a:fontRef idx="minor"/>
+    </dgm:style>
+  </dgm:styleLbl>
+  <dgm:styleLbl name="solidAlignAcc1">
+    <dgm:scene3d>
+      <a:camera prst="orthographicFront"/>
+      <a:lightRig rig="threePt" dir="t"/>
+    </dgm:scene3d>
+    <dgm:sp3d/>
+    <dgm:txPr/>
+    <dgm:style>
+      <a:lnRef idx="2">
+        <a:scrgbClr r="0" g="0" b="0"/>
+      </a:lnRef>
+      <a:fillRef idx="1">
+        <a:scrgbClr r="0" g="0" b="0"/>
+      </a:fillRef>
+      <a:effectRef idx="0">
+        <a:scrgbClr r="0" g="0" b="0"/>
+      </a:effectRef>
+      <a:fontRef idx="minor"/>
+    </dgm:style>
+  </dgm:styleLbl>
+  <dgm:styleLbl name="solidBgAcc1">
+    <dgm:scene3d>
+      <a:camera prst="orthographicFront"/>
+      <a:lightRig rig="threePt" dir="t"/>
+    </dgm:scene3d>
+    <dgm:sp3d/>
+    <dgm:txPr/>
+    <dgm:style>
+      <a:lnRef idx="2">
+        <a:scrgbClr r="0" g="0" b="0"/>
+      </a:lnRef>
+      <a:fillRef idx="1">
+        <a:scrgbClr r="0" g="0" b="0"/>
+      </a:fillRef>
+      <a:effectRef idx="0">
+        <a:scrgbClr r="0" g="0" b="0"/>
+      </a:effectRef>
+      <a:fontRef idx="minor"/>
+    </dgm:style>
+  </dgm:styleLbl>
+  <dgm:styleLbl name="fgAccFollowNode1">
+    <dgm:scene3d>
+      <a:camera prst="orthographicFront"/>
+      <a:lightRig rig="threePt" dir="t"/>
+    </dgm:scene3d>
+    <dgm:sp3d/>
+    <dgm:txPr/>
+    <dgm:style>
+      <a:lnRef idx="2">
+        <a:scrgbClr r="0" g="0" b="0"/>
+      </a:lnRef>
+      <a:fillRef idx="1">
+        <a:scrgbClr r="0" g="0" b="0"/>
+      </a:fillRef>
+      <a:effectRef idx="0">
+        <a:scrgbClr r="0" g="0" b="0"/>
+      </a:effectRef>
+      <a:fontRef idx="minor"/>
+    </dgm:style>
+  </dgm:styleLbl>
+  <dgm:styleLbl name="alignAccFollowNode1">
+    <dgm:scene3d>
+      <a:camera prst="orthographicFront"/>
+      <a:lightRig rig="threePt" dir="t"/>
+    </dgm:scene3d>
+    <dgm:sp3d/>
+    <dgm:txPr/>
+    <dgm:style>
+      <a:lnRef idx="2">
+        <a:scrgbClr r="0" g="0" b="0"/>
+      </a:lnRef>
+      <a:fillRef idx="1">
+        <a:scrgbClr r="0" g="0" b="0"/>
+      </a:fillRef>
+      <a:effectRef idx="0">
+        <a:scrgbClr r="0" g="0" b="0"/>
+      </a:effectRef>
+      <a:fontRef idx="minor"/>
+    </dgm:style>
+  </dgm:styleLbl>
+  <dgm:styleLbl name="bgAccFollowNode1">
+    <dgm:scene3d>
+      <a:camera prst="orthographicFront"/>
+      <a:lightRig rig="threePt" dir="t"/>
+    </dgm:scene3d>
+    <dgm:sp3d/>
+    <dgm:txPr/>
+    <dgm:style>
+      <a:lnRef idx="2">
+        <a:scrgbClr r="0" g="0" b="0"/>
+      </a:lnRef>
+      <a:fillRef idx="1">
+        <a:scrgbClr r="0" g="0" b="0"/>
+      </a:fillRef>
+      <a:effectRef idx="0">
+        <a:scrgbClr r="0" g="0" b="0"/>
+      </a:effectRef>
+      <a:fontRef idx="minor"/>
+    </dgm:style>
+  </dgm:styleLbl>
+  <dgm:styleLbl name="fgAcc0">
+    <dgm:scene3d>
+      <a:camera prst="orthographicFront"/>
+      <a:lightRig rig="threePt" dir="t"/>
+    </dgm:scene3d>
+    <dgm:sp3d/>
+    <dgm:txPr/>
+    <dgm:style>
+      <a:lnRef idx="2">
+        <a:scrgbClr r="0" g="0" b="0"/>
+      </a:lnRef>
+      <a:fillRef idx="1">
+        <a:scrgbClr r="0" g="0" b="0"/>
+      </a:fillRef>
+      <a:effectRef idx="0">
+        <a:scrgbClr r="0" g="0" b="0"/>
+      </a:effectRef>
+      <a:fontRef idx="minor"/>
+    </dgm:style>
+  </dgm:styleLbl>
+  <dgm:styleLbl name="fgAcc2">
+    <dgm:scene3d>
+      <a:camera prst="orthographicFront"/>
+      <a:lightRig rig="threePt" dir="t"/>
+    </dgm:scene3d>
+    <dgm:sp3d/>
+    <dgm:txPr/>
+    <dgm:style>
+      <a:lnRef idx="2">
+        <a:scrgbClr r="0" g="0" b="0"/>
+      </a:lnRef>
+      <a:fillRef idx="1">
+        <a:scrgbClr r="0" g="0" b="0"/>
+      </a:fillRef>
+      <a:effectRef idx="0">
+        <a:scrgbClr r="0" g="0" b="0"/>
+      </a:effectRef>
+      <a:fontRef idx="minor"/>
+    </dgm:style>
+  </dgm:styleLbl>
+  <dgm:styleLbl name="fgAcc3">
+    <dgm:scene3d>
+      <a:camera prst="orthographicFront"/>
+      <a:lightRig rig="threePt" dir="t"/>
+    </dgm:scene3d>
+    <dgm:sp3d/>
+    <dgm:txPr/>
+    <dgm:style>
+      <a:lnRef idx="2">
+        <a:scrgbClr r="0" g="0" b="0"/>
+      </a:lnRef>
+      <a:fillRef idx="1">
+        <a:scrgbClr r="0" g="0" b="0"/>
+      </a:fillRef>
+      <a:effectRef idx="0">
+        <a:scrgbClr r="0" g="0" b="0"/>
+      </a:effectRef>
+      <a:fontRef idx="minor"/>
+    </dgm:style>
+  </dgm:styleLbl>
+  <dgm:styleLbl name="fgAcc4">
+    <dgm:scene3d>
+      <a:camera prst="orthographicFront"/>
+      <a:lightRig rig="threePt" dir="t"/>
+    </dgm:scene3d>
+    <dgm:sp3d/>
+    <dgm:txPr/>
+    <dgm:style>
+      <a:lnRef idx="2">
+        <a:scrgbClr r="0" g="0" b="0"/>
+      </a:lnRef>
+      <a:fillRef idx="1">
+        <a:scrgbClr r="0" g="0" b="0"/>
+      </a:fillRef>
+      <a:effectRef idx="0">
+        <a:scrgbClr r="0" g="0" b="0"/>
+      </a:effectRef>
+      <a:fontRef idx="minor"/>
+    </dgm:style>
+  </dgm:styleLbl>
+  <dgm:styleLbl name="bgShp">
+    <dgm:scene3d>
+      <a:camera prst="orthographicFront"/>
+      <a:lightRig rig="threePt" dir="t"/>
+    </dgm:scene3d>
+    <dgm:sp3d/>
+    <dgm:txPr/>
+    <dgm:style>
+      <a:lnRef idx="0">
+        <a:scrgbClr r="0" g="0" b="0"/>
+      </a:lnRef>
+      <a:fillRef idx="1">
+        <a:scrgbClr r="0" g="0" b="0"/>
+      </a:fillRef>
+      <a:effectRef idx="0">
+        <a:scrgbClr r="0" g="0" b="0"/>
+      </a:effectRef>
+      <a:fontRef idx="minor"/>
+    </dgm:style>
+  </dgm:styleLbl>
+  <dgm:styleLbl name="dkBgShp">
+    <dgm:scene3d>
+      <a:camera prst="orthographicFront"/>
+      <a:lightRig rig="threePt" dir="t"/>
+    </dgm:scene3d>
+    <dgm:sp3d/>
+    <dgm:txPr/>
+    <dgm:style>
+      <a:lnRef idx="0">
+        <a:scrgbClr r="0" g="0" b="0"/>
+      </a:lnRef>
+      <a:fillRef idx="1">
+        <a:scrgbClr r="0" g="0" b="0"/>
+      </a:fillRef>
+      <a:effectRef idx="0">
+        <a:scrgbClr r="0" g="0" b="0"/>
+      </a:effectRef>
+      <a:fontRef idx="minor"/>
+    </dgm:style>
+  </dgm:styleLbl>
+  <dgm:styleLbl name="trBgShp">
+    <dgm:scene3d>
+      <a:camera prst="orthographicFront"/>
+      <a:lightRig rig="threePt" dir="t"/>
+    </dgm:scene3d>
+    <dgm:sp3d/>
+    <dgm:txPr/>
+    <dgm:style>
+      <a:lnRef idx="0">
+        <a:scrgbClr r="0" g="0" b="0"/>
+      </a:lnRef>
+      <a:fillRef idx="1">
+        <a:scrgbClr r="0" g="0" b="0"/>
+      </a:fillRef>
+      <a:effectRef idx="0">
+        <a:scrgbClr r="0" g="0" b="0"/>
+      </a:effectRef>
+      <a:fontRef idx="minor"/>
+    </dgm:style>
+  </dgm:styleLbl>
+  <dgm:styleLbl name="fgShp">
+    <dgm:scene3d>
+      <a:camera prst="orthographicFront"/>
+      <a:lightRig rig="threePt" dir="t"/>
+    </dgm:scene3d>
+    <dgm:sp3d/>
+    <dgm:txPr/>
+    <dgm:style>
+      <a:lnRef idx="2">
+        <a:scrgbClr r="0" g="0" b="0"/>
+      </a:lnRef>
+      <a:fillRef idx="1">
+        <a:scrgbClr r="0" g="0" b="0"/>
+      </a:fillRef>
+      <a:effectRef idx="0">
+        <a:scrgbClr r="0" g="0" b="0"/>
+      </a:effectRef>
+      <a:fontRef idx="minor"/>
+    </dgm:style>
+  </dgm:styleLbl>
+  <dgm:styleLbl name="revTx">
+    <dgm:scene3d>
+      <a:camera prst="orthographicFront"/>
+      <a:lightRig rig="threePt" dir="t"/>
+    </dgm:scene3d>
+    <dgm:sp3d/>
+    <dgm:txPr/>
+    <dgm:style>
+      <a:lnRef idx="0">
+        <a:scrgbClr r="0" g="0" b="0"/>
+      </a:lnRef>
+      <a:fillRef idx="0">
+        <a:scrgbClr r="0" g="0" b="0"/>
+      </a:fillRef>
+      <a:effectRef idx="0">
+        <a:scrgbClr r="0" g="0" b="0"/>
+      </a:effectRef>
+      <a:fontRef idx="minor"/>
+    </dgm:style>
+  </dgm:styleLbl>
+</dgm:styleDef>
+</file>
+
+<file path=ppt/diagrams/quickStyle2.xml><?xml version="1.0" encoding="utf-8"?>
 <dgm:styleDef xmlns:dgm="http://schemas.openxmlformats.org/drawingml/2006/diagram" xmlns:a="http://schemas.openxmlformats.org/drawingml/2006/main" uniqueId="urn:microsoft.com/office/officeart/2005/8/quickstyle/simple1">
   <dgm:title val=""/>
   <dgm:desc val=""/>
@@ -7281,37 +10103,31 @@
             <p:ph type="title"/>
           </p:nvPr>
         </p:nvSpPr>
-        <p:spPr/>
+        <p:spPr>
+          <a:xfrm>
+            <a:off x="408076" y="1170372"/>
+            <a:ext cx="11012400" cy="492443"/>
+          </a:xfrm>
+        </p:spPr>
         <p:txBody>
-          <a:bodyPr/>
+          <a:bodyPr wrap="square" anchor="t">
+            <a:normAutofit/>
+          </a:bodyPr>
           <a:lstStyle/>
           <a:p>
-            <a:endParaRPr lang="de-CH"/>
-          </a:p>
-        </p:txBody>
-      </p:sp>
-      <p:sp>
-        <p:nvSpPr>
-          <p:cNvPr id="3" name="Inhaltsplatzhalter 2">
-            <a:extLst>
-              <a:ext uri="{FF2B5EF4-FFF2-40B4-BE49-F238E27FC236}">
-                <a16:creationId xmlns:a16="http://schemas.microsoft.com/office/drawing/2014/main" id="{17D6F3C5-F021-B565-B1E2-31F9B9CB683F}"/>
-              </a:ext>
-            </a:extLst>
-          </p:cNvPr>
-          <p:cNvSpPr>
-            <a:spLocks noGrp="1"/>
-          </p:cNvSpPr>
-          <p:nvPr>
-            <p:ph idx="1"/>
-          </p:nvPr>
-        </p:nvSpPr>
-        <p:spPr/>
-        <p:txBody>
-          <a:bodyPr/>
-          <a:lstStyle/>
-          <a:p>
-            <a:endParaRPr lang="de-CH"/>
+            <a:r>
+              <a:rPr lang="de-CH" dirty="0" err="1"/>
+              <a:t>Lessons</a:t>
+            </a:r>
+            <a:r>
+              <a:rPr lang="de-CH" dirty="0"/>
+              <a:t> </a:t>
+            </a:r>
+            <a:r>
+              <a:rPr lang="de-CH" dirty="0" err="1"/>
+              <a:t>Learned</a:t>
+            </a:r>
+            <a:endParaRPr lang="de-CH" dirty="0"/>
           </a:p>
         </p:txBody>
       </p:sp>
@@ -7331,16 +10147,31 @@
             <p:ph type="dt" sz="half" idx="10"/>
           </p:nvPr>
         </p:nvSpPr>
-        <p:spPr/>
+        <p:spPr>
+          <a:xfrm>
+            <a:off x="419100" y="6620400"/>
+            <a:ext cx="1188000" cy="144016"/>
+          </a:xfrm>
+        </p:spPr>
         <p:txBody>
-          <a:bodyPr/>
+          <a:bodyPr anchor="t">
+            <a:normAutofit/>
+          </a:bodyPr>
           <a:lstStyle/>
           <a:p>
+            <a:pPr>
+              <a:lnSpc>
+                <a:spcPct val="90000"/>
+              </a:lnSpc>
+              <a:spcAft>
+                <a:spcPts val="600"/>
+              </a:spcAft>
+            </a:pPr>
             <a:r>
               <a:rPr lang="de-DE"/>
               <a:t>23 June 2025</a:t>
             </a:r>
-            <a:endParaRPr lang="de-CH" dirty="0"/>
+            <a:endParaRPr lang="de-CH"/>
           </a:p>
         </p:txBody>
       </p:sp>
@@ -7360,16 +10191,30 @@
             <p:ph type="ftr" sz="quarter" idx="11"/>
           </p:nvPr>
         </p:nvSpPr>
-        <p:spPr/>
+        <p:spPr>
+          <a:xfrm>
+            <a:off x="1667508" y="6620400"/>
+            <a:ext cx="8100000" cy="144016"/>
+          </a:xfrm>
+        </p:spPr>
         <p:txBody>
-          <a:bodyPr/>
+          <a:bodyPr anchor="t">
+            <a:normAutofit/>
+          </a:bodyPr>
           <a:lstStyle/>
           <a:p>
+            <a:pPr>
+              <a:lnSpc>
+                <a:spcPct val="90000"/>
+              </a:lnSpc>
+              <a:spcAft>
+                <a:spcPts val="600"/>
+              </a:spcAft>
+            </a:pPr>
             <a:r>
               <a:rPr lang="de-CH"/>
               <a:t>Zumi7337 team presentation</a:t>
             </a:r>
-            <a:endParaRPr lang="de-CH" dirty="0"/>
           </a:p>
         </p:txBody>
       </p:sp>
@@ -7389,20 +10234,73 @@
             <p:ph type="sldNum" sz="quarter" idx="12"/>
           </p:nvPr>
         </p:nvSpPr>
-        <p:spPr/>
+        <p:spPr>
+          <a:xfrm>
+            <a:off x="11460596" y="6620400"/>
+            <a:ext cx="376710" cy="144016"/>
+          </a:xfrm>
+        </p:spPr>
         <p:txBody>
-          <a:bodyPr/>
+          <a:bodyPr anchor="t">
+            <a:normAutofit/>
+          </a:bodyPr>
           <a:lstStyle/>
           <a:p>
+            <a:pPr>
+              <a:lnSpc>
+                <a:spcPct val="90000"/>
+              </a:lnSpc>
+              <a:spcAft>
+                <a:spcPts val="600"/>
+              </a:spcAft>
+            </a:pPr>
             <a:fld id="{442AD375-037F-43D0-B059-5172DA06796A}" type="slidenum">
               <a:rPr lang="de-CH" smtClean="0"/>
-              <a:pPr/>
+              <a:pPr>
+                <a:lnSpc>
+                  <a:spcPct val="90000"/>
+                </a:lnSpc>
+                <a:spcAft>
+                  <a:spcPts val="600"/>
+                </a:spcAft>
+              </a:pPr>
               <a:t>4</a:t>
             </a:fld>
-            <a:endParaRPr lang="de-CH" dirty="0"/>
+            <a:endParaRPr lang="de-CH"/>
           </a:p>
         </p:txBody>
       </p:sp>
+      <p:graphicFrame>
+        <p:nvGraphicFramePr>
+          <p:cNvPr id="10" name="Inhaltsplatzhalter 2">
+            <a:extLst>
+              <a:ext uri="{FF2B5EF4-FFF2-40B4-BE49-F238E27FC236}">
+                <a16:creationId xmlns:a16="http://schemas.microsoft.com/office/drawing/2014/main" id="{FB4B2195-71B0-017C-4986-3FC974C565C9}"/>
+              </a:ext>
+            </a:extLst>
+          </p:cNvPr>
+          <p:cNvGraphicFramePr>
+            <a:graphicFrameLocks noGrp="1"/>
+          </p:cNvGraphicFramePr>
+          <p:nvPr>
+            <p:ph idx="1"/>
+            <p:extLst>
+              <p:ext uri="{D42A27DB-BD31-4B8C-83A1-F6EECF244321}">
+                <p14:modId xmlns:p14="http://schemas.microsoft.com/office/powerpoint/2010/main" val="569184105"/>
+              </p:ext>
+            </p:extLst>
+          </p:nvPr>
+        </p:nvGraphicFramePr>
+        <p:xfrm>
+          <a:off x="408075" y="1989138"/>
+          <a:ext cx="11013193" cy="4175125"/>
+        </p:xfrm>
+        <a:graphic>
+          <a:graphicData uri="http://schemas.openxmlformats.org/drawingml/2006/diagram">
+            <dgm:relIds xmlns:dgm="http://schemas.openxmlformats.org/drawingml/2006/diagram" xmlns:r="http://schemas.openxmlformats.org/officeDocument/2006/relationships" r:dm="rId2" r:lo="rId3" r:qs="rId4" r:cs="rId5"/>
+          </a:graphicData>
+        </a:graphic>
+      </p:graphicFrame>
     </p:spTree>
     <p:extLst>
       <p:ext uri="{BB962C8B-B14F-4D97-AF65-F5344CB8AC3E}">
@@ -8558,12 +11456,9 @@
 </file>
 
 <file path=customXml/item1.xml><?xml version="1.0" encoding="utf-8"?>
-<?mso-contentType ?>
-<FormTemplates xmlns="http://schemas.microsoft.com/sharepoint/v3/contenttype/forms">
-  <Display>DocumentLibraryForm</Display>
-  <Edit>DocumentLibraryForm</Edit>
-  <New>DocumentLibraryForm</New>
-</FormTemplates>
+<p:properties xmlns:p="http://schemas.microsoft.com/office/2006/metadata/properties" xmlns:xsi="http://www.w3.org/2001/XMLSchema-instance" xmlns:pc="http://schemas.microsoft.com/office/infopath/2007/PartnerControls">
+  <documentManagement/>
+</p:properties>
 </file>
 
 <file path=customXml/item2.xml><?xml version="1.0" encoding="utf-8"?>
@@ -8711,15 +11606,27 @@
 </file>
 
 <file path=customXml/item3.xml><?xml version="1.0" encoding="utf-8"?>
-<p:properties xmlns:p="http://schemas.microsoft.com/office/2006/metadata/properties" xmlns:xsi="http://www.w3.org/2001/XMLSchema-instance" xmlns:pc="http://schemas.microsoft.com/office/infopath/2007/PartnerControls">
-  <documentManagement/>
-</p:properties>
+<?mso-contentType ?>
+<FormTemplates xmlns="http://schemas.microsoft.com/sharepoint/v3/contenttype/forms">
+  <Display>DocumentLibraryForm</Display>
+  <Edit>DocumentLibraryForm</Edit>
+  <New>DocumentLibraryForm</New>
+</FormTemplates>
 </file>
 
 <file path=customXml/itemProps1.xml><?xml version="1.0" encoding="utf-8"?>
-<ds:datastoreItem xmlns:ds="http://schemas.openxmlformats.org/officeDocument/2006/customXml" ds:itemID="{4B6B7BE2-63AD-4C37-AC44-F0E4FC348E24}">
+<ds:datastoreItem xmlns:ds="http://schemas.openxmlformats.org/officeDocument/2006/customXml" ds:itemID="{5626B806-0237-4942-A1FD-5C97285908C2}">
   <ds:schemaRefs>
-    <ds:schemaRef ds:uri="http://schemas.microsoft.com/sharepoint/v3/contenttype/forms"/>
+    <ds:schemaRef ds:uri="http://purl.org/dc/dcmitype/"/>
+    <ds:schemaRef ds:uri="http://schemas.openxmlformats.org/package/2006/metadata/core-properties"/>
+    <ds:schemaRef ds:uri="http://purl.org/dc/elements/1.1/"/>
+    <ds:schemaRef ds:uri="http://schemas.microsoft.com/office/2006/metadata/properties"/>
+    <ds:schemaRef ds:uri="c9077d15-72ed-4fec-bcfe-3472729e9195"/>
+    <ds:schemaRef ds:uri="http://schemas.microsoft.com/office/2006/documentManagement/types"/>
+    <ds:schemaRef ds:uri="http://purl.org/dc/terms/"/>
+    <ds:schemaRef ds:uri="http://schemas.microsoft.com/office/infopath/2007/PartnerControls"/>
+    <ds:schemaRef ds:uri="bc24777f-78b6-4f3c-a73a-d5fa08e4d537"/>
+    <ds:schemaRef ds:uri="http://www.w3.org/XML/1998/namespace"/>
   </ds:schemaRefs>
 </ds:datastoreItem>
 </file>
@@ -8743,18 +11650,9 @@
 </file>
 
 <file path=customXml/itemProps3.xml><?xml version="1.0" encoding="utf-8"?>
-<ds:datastoreItem xmlns:ds="http://schemas.openxmlformats.org/officeDocument/2006/customXml" ds:itemID="{5626B806-0237-4942-A1FD-5C97285908C2}">
+<ds:datastoreItem xmlns:ds="http://schemas.openxmlformats.org/officeDocument/2006/customXml" ds:itemID="{4B6B7BE2-63AD-4C37-AC44-F0E4FC348E24}">
   <ds:schemaRefs>
-    <ds:schemaRef ds:uri="http://purl.org/dc/dcmitype/"/>
-    <ds:schemaRef ds:uri="http://schemas.openxmlformats.org/package/2006/metadata/core-properties"/>
-    <ds:schemaRef ds:uri="http://purl.org/dc/elements/1.1/"/>
-    <ds:schemaRef ds:uri="http://schemas.microsoft.com/office/2006/metadata/properties"/>
-    <ds:schemaRef ds:uri="c9077d15-72ed-4fec-bcfe-3472729e9195"/>
-    <ds:schemaRef ds:uri="http://schemas.microsoft.com/office/2006/documentManagement/types"/>
-    <ds:schemaRef ds:uri="http://purl.org/dc/terms/"/>
-    <ds:schemaRef ds:uri="http://schemas.microsoft.com/office/infopath/2007/PartnerControls"/>
-    <ds:schemaRef ds:uri="bc24777f-78b6-4f3c-a73a-d5fa08e4d537"/>
-    <ds:schemaRef ds:uri="http://www.w3.org/XML/1998/namespace"/>
+    <ds:schemaRef ds:uri="http://schemas.microsoft.com/sharepoint/v3/contenttype/forms"/>
   </ds:schemaRefs>
 </ds:datastoreItem>
 </file>
</xml_diff>

<commit_message>
order of lessons learned changed
</commit_message>
<xml_diff>
--- a/documents/Zumi7337 team presentation.pptx
+++ b/documents/Zumi7337 team presentation.pptx
@@ -2239,12 +2239,15 @@
             <a:lnSpc>
               <a:spcPct val="100000"/>
             </a:lnSpc>
+            <a:buClrTx/>
+            <a:buSzTx/>
+            <a:buFont typeface="Arial" panose="020B0604020202020204" pitchFamily="34" charset="0"/>
+            <a:buChar char="•"/>
           </a:pPr>
           <a:r>
-            <a:rPr lang="de-CH"/>
-            <a:t>Leverage what you already know</a:t>
+            <a:rPr lang="en-GB" noProof="0" dirty="0"/>
+            <a:t>Robots react to their environment </a:t>
           </a:r>
-          <a:endParaRPr lang="en-US"/>
         </a:p>
       </dgm:t>
     </dgm:pt>
@@ -2283,10 +2286,9 @@
             </a:lnSpc>
           </a:pPr>
           <a:r>
-            <a:rPr lang="de-CH"/>
-            <a:t>Robots react to their environment </a:t>
+            <a:rPr lang="en-GB" noProof="0" dirty="0"/>
+            <a:t>Test small, save big</a:t>
           </a:r>
-          <a:endParaRPr lang="en-US"/>
         </a:p>
       </dgm:t>
     </dgm:pt>
@@ -2325,10 +2327,9 @@
             </a:lnSpc>
           </a:pPr>
           <a:r>
-            <a:rPr lang="de-CH"/>
-            <a:t>Test small, save big</a:t>
+            <a:rPr lang="en-GB" noProof="0" dirty="0"/>
+            <a:t>Leverage what you already know</a:t>
           </a:r>
-          <a:endParaRPr lang="en-US"/>
         </a:p>
       </dgm:t>
     </dgm:pt>
@@ -2370,27 +2371,14 @@
     <dgm:pt modelId="{43D2D36A-E1FF-49B6-9AD1-A6C0D3213F6E}" type="pres">
       <dgm:prSet presAssocID="{26D5102E-056D-4D72-A046-B085B7E88976}" presName="iconRect" presStyleLbl="node1" presStyleIdx="0" presStyleCnt="3"/>
       <dgm:spPr>
-        <a:blipFill>
-          <a:blip xmlns:r="http://schemas.openxmlformats.org/officeDocument/2006/relationships" r:embed="rId1">
-            <a:extLst>
-              <a:ext uri="{28A0092B-C50C-407E-A947-70E740481C1C}">
-                <a14:useLocalDpi xmlns:a14="http://schemas.microsoft.com/office/drawing/2010/main" val="0"/>
-              </a:ext>
-              <a:ext uri="{96DAC541-7B7A-43D3-8B79-37D633B846F1}">
-                <asvg:svgBlip xmlns:asvg="http://schemas.microsoft.com/office/drawing/2016/SVG/main" r:embed="rId2"/>
-              </a:ext>
-            </a:extLst>
-          </a:blip>
+        <a:blipFill rotWithShape="1">
+          <a:blip xmlns:r="http://schemas.openxmlformats.org/officeDocument/2006/relationships" r:embed="rId1"/>
+          <a:srcRect/>
           <a:stretch>
             <a:fillRect/>
           </a:stretch>
         </a:blipFill>
       </dgm:spPr>
-      <dgm:extLst>
-        <a:ext uri="{E40237B7-FDA0-4F09-8148-C483321AD2D9}">
-          <dgm14:cNvPr xmlns:dgm14="http://schemas.microsoft.com/office/drawing/2010/diagram" id="0" name="" descr="Head with Gears"/>
-        </a:ext>
-      </dgm:extLst>
     </dgm:pt>
     <dgm:pt modelId="{5E293013-3226-403E-9551-455E1659A6DC}" type="pres">
       <dgm:prSet presAssocID="{26D5102E-056D-4D72-A046-B085B7E88976}" presName="spaceRect" presStyleCnt="0"/>
@@ -2414,29 +2402,25 @@
       <dgm:spPr/>
     </dgm:pt>
     <dgm:pt modelId="{A23150EC-9444-43C1-95E6-4ADDC2BCD192}" type="pres">
-      <dgm:prSet presAssocID="{AC73764E-6681-48FF-8E3C-7F16EC36959D}" presName="iconRect" presStyleLbl="node1" presStyleIdx="1" presStyleCnt="3"/>
+      <dgm:prSet presAssocID="{AC73764E-6681-48FF-8E3C-7F16EC36959D}" presName="iconRect" presStyleLbl="node1" presStyleIdx="1" presStyleCnt="3" custLinFactX="100000" custLinFactNeighborX="160018" custLinFactNeighborY="-7671"/>
       <dgm:spPr>
-        <a:blipFill>
-          <a:blip xmlns:r="http://schemas.openxmlformats.org/officeDocument/2006/relationships" r:embed="rId3">
+        <a:blipFill rotWithShape="1">
+          <a:blip xmlns:r="http://schemas.openxmlformats.org/officeDocument/2006/relationships" r:embed="rId2">
             <a:extLst>
               <a:ext uri="{28A0092B-C50C-407E-A947-70E740481C1C}">
                 <a14:useLocalDpi xmlns:a14="http://schemas.microsoft.com/office/drawing/2010/main" val="0"/>
               </a:ext>
               <a:ext uri="{96DAC541-7B7A-43D3-8B79-37D633B846F1}">
-                <asvg:svgBlip xmlns:asvg="http://schemas.microsoft.com/office/drawing/2016/SVG/main" r:embed="rId4"/>
+                <asvg:svgBlip xmlns:asvg="http://schemas.microsoft.com/office/drawing/2016/SVG/main" r:embed="rId3"/>
               </a:ext>
             </a:extLst>
           </a:blip>
+          <a:srcRect/>
           <a:stretch>
             <a:fillRect/>
           </a:stretch>
         </a:blipFill>
       </dgm:spPr>
-      <dgm:extLst>
-        <a:ext uri="{E40237B7-FDA0-4F09-8148-C483321AD2D9}">
-          <dgm14:cNvPr xmlns:dgm14="http://schemas.microsoft.com/office/drawing/2010/diagram" id="0" name="" descr="Roboter"/>
-        </a:ext>
-      </dgm:extLst>
     </dgm:pt>
     <dgm:pt modelId="{142FDFE1-88DF-46FF-9085-081EE57057B8}" type="pres">
       <dgm:prSet presAssocID="{AC73764E-6681-48FF-8E3C-7F16EC36959D}" presName="spaceRect" presStyleCnt="0"/>
@@ -2460,13 +2444,13 @@
       <dgm:spPr/>
     </dgm:pt>
     <dgm:pt modelId="{E2A27A26-0FBE-4566-A2FD-3E494E2F285D}" type="pres">
-      <dgm:prSet presAssocID="{293DF046-A1C7-403F-8791-2CCC2F7F3863}" presName="iconRect" presStyleLbl="node1" presStyleIdx="2" presStyleCnt="3"/>
+      <dgm:prSet presAssocID="{293DF046-A1C7-403F-8791-2CCC2F7F3863}" presName="iconRect" presStyleLbl="node1" presStyleIdx="2" presStyleCnt="3" custLinFactX="-100000" custLinFactNeighborX="-161138" custLinFactNeighborY="-6554"/>
       <dgm:spPr>
         <a:blipFill>
-          <a:blip xmlns:r="http://schemas.openxmlformats.org/officeDocument/2006/relationships" r:embed="rId5">
+          <a:blip xmlns:r="http://schemas.openxmlformats.org/officeDocument/2006/relationships" r:embed="rId4">
             <a:extLst>
               <a:ext uri="{96DAC541-7B7A-43D3-8B79-37D633B846F1}">
-                <asvg:svgBlip xmlns:asvg="http://schemas.microsoft.com/office/drawing/2016/SVG/main" r:embed="rId6"/>
+                <asvg:svgBlip xmlns:asvg="http://schemas.microsoft.com/office/drawing/2016/SVG/main" r:embed="rId5"/>
               </a:ext>
             </a:extLst>
           </a:blip>
@@ -3025,17 +3009,9 @@
         <a:prstGeom prst="rect">
           <a:avLst/>
         </a:prstGeom>
-        <a:blipFill>
-          <a:blip xmlns:r="http://schemas.openxmlformats.org/officeDocument/2006/relationships" r:embed="rId1">
-            <a:extLst>
-              <a:ext uri="{28A0092B-C50C-407E-A947-70E740481C1C}">
-                <a14:useLocalDpi xmlns:a14="http://schemas.microsoft.com/office/drawing/2010/main" val="0"/>
-              </a:ext>
-              <a:ext uri="{96DAC541-7B7A-43D3-8B79-37D633B846F1}">
-                <asvg:svgBlip xmlns:asvg="http://schemas.microsoft.com/office/drawing/2016/SVG/main" r:embed="rId2"/>
-              </a:ext>
-            </a:extLst>
-          </a:blip>
+        <a:blipFill rotWithShape="1">
+          <a:blip xmlns:r="http://schemas.openxmlformats.org/officeDocument/2006/relationships" r:embed="rId1"/>
+          <a:srcRect/>
           <a:stretch>
             <a:fillRect/>
           </a:stretch>
@@ -3116,13 +3092,15 @@
             <a:spcAft>
               <a:spcPct val="35000"/>
             </a:spcAft>
+            <a:buClrTx/>
+            <a:buSzTx/>
+            <a:buFont typeface="Arial" panose="020B0604020202020204" pitchFamily="34" charset="0"/>
             <a:buNone/>
           </a:pPr>
           <a:r>
-            <a:rPr lang="de-CH" sz="2400" kern="1200"/>
-            <a:t>Leverage what you already know</a:t>
+            <a:rPr lang="en-GB" sz="2400" kern="1200" noProof="0" dirty="0"/>
+            <a:t>Robots react to their environment </a:t>
           </a:r>
-          <a:endParaRPr lang="en-US" sz="2400" kern="1200"/>
         </a:p>
       </dsp:txBody>
       <dsp:txXfrm>
@@ -3137,23 +3115,24 @@
       </dsp:nvSpPr>
       <dsp:spPr>
         <a:xfrm>
-          <a:off x="4777695" y="806499"/>
+          <a:off x="8568244" y="694671"/>
           <a:ext cx="1457802" cy="1457802"/>
         </a:xfrm>
         <a:prstGeom prst="rect">
           <a:avLst/>
         </a:prstGeom>
-        <a:blipFill>
-          <a:blip xmlns:r="http://schemas.openxmlformats.org/officeDocument/2006/relationships" r:embed="rId3">
+        <a:blipFill rotWithShape="1">
+          <a:blip xmlns:r="http://schemas.openxmlformats.org/officeDocument/2006/relationships" r:embed="rId2">
             <a:extLst>
               <a:ext uri="{28A0092B-C50C-407E-A947-70E740481C1C}">
                 <a14:useLocalDpi xmlns:a14="http://schemas.microsoft.com/office/drawing/2010/main" val="0"/>
               </a:ext>
               <a:ext uri="{96DAC541-7B7A-43D3-8B79-37D633B846F1}">
-                <asvg:svgBlip xmlns:asvg="http://schemas.microsoft.com/office/drawing/2016/SVG/main" r:embed="rId4"/>
+                <asvg:svgBlip xmlns:asvg="http://schemas.microsoft.com/office/drawing/2016/SVG/main" r:embed="rId3"/>
               </a:ext>
             </a:extLst>
           </a:blip>
+          <a:srcRect/>
           <a:stretch>
             <a:fillRect/>
           </a:stretch>
@@ -3237,10 +3216,9 @@
             <a:buNone/>
           </a:pPr>
           <a:r>
-            <a:rPr lang="de-CH" sz="2400" kern="1200"/>
-            <a:t>Robots react to their environment </a:t>
+            <a:rPr lang="en-GB" sz="2400" kern="1200" noProof="0" dirty="0"/>
+            <a:t>Test small, save big</a:t>
           </a:r>
-          <a:endParaRPr lang="en-US" sz="2400" kern="1200"/>
         </a:p>
       </dsp:txBody>
       <dsp:txXfrm>
@@ -3255,17 +3233,17 @@
       </dsp:nvSpPr>
       <dsp:spPr>
         <a:xfrm>
-          <a:off x="8584179" y="806499"/>
+          <a:off x="4777303" y="710955"/>
           <a:ext cx="1457802" cy="1457802"/>
         </a:xfrm>
         <a:prstGeom prst="rect">
           <a:avLst/>
         </a:prstGeom>
         <a:blipFill>
-          <a:blip xmlns:r="http://schemas.openxmlformats.org/officeDocument/2006/relationships" r:embed="rId5">
+          <a:blip xmlns:r="http://schemas.openxmlformats.org/officeDocument/2006/relationships" r:embed="rId4">
             <a:extLst>
               <a:ext uri="{96DAC541-7B7A-43D3-8B79-37D633B846F1}">
-                <asvg:svgBlip xmlns:asvg="http://schemas.microsoft.com/office/drawing/2016/SVG/main" r:embed="rId6"/>
+                <asvg:svgBlip xmlns:asvg="http://schemas.microsoft.com/office/drawing/2016/SVG/main" r:embed="rId5"/>
               </a:ext>
             </a:extLst>
           </a:blip>
@@ -3353,10 +3331,9 @@
             <a:buNone/>
           </a:pPr>
           <a:r>
-            <a:rPr lang="de-CH" sz="2400" kern="1200"/>
-            <a:t>Test small, save big</a:t>
+            <a:rPr lang="en-GB" sz="2400" kern="1200" noProof="0" dirty="0"/>
+            <a:t>Leverage what you already know</a:t>
           </a:r>
-          <a:endParaRPr lang="en-US" sz="2400" kern="1200"/>
         </a:p>
       </dsp:txBody>
       <dsp:txXfrm>
@@ -5902,7 +5879,7 @@
           <a:p>
             <a:fld id="{EEC665CA-D682-48EC-95D2-126FD6449D65}" type="datetime1">
               <a:rPr lang="de-CH" sz="900" smtClean="0"/>
-              <a:t>17.06.2025</a:t>
+              <a:t>19.06.2025</a:t>
             </a:fld>
             <a:endParaRPr lang="de-CH" sz="900"/>
           </a:p>
@@ -6220,7 +6197,7 @@
           <a:p>
             <a:fld id="{A17AAF7D-4283-4014-80F4-26E915FEACF8}" type="datetime1">
               <a:rPr lang="de-CH" smtClean="0"/>
-              <a:t>17.06.2025</a:t>
+              <a:t>19.06.2025</a:t>
             </a:fld>
             <a:endParaRPr lang="de-CH" dirty="0"/>
           </a:p>
@@ -10116,18 +10093,9 @@
           <a:lstStyle/>
           <a:p>
             <a:r>
-              <a:rPr lang="de-CH" dirty="0" err="1"/>
-              <a:t>Lessons</a:t>
+              <a:rPr lang="en-GB" noProof="0" dirty="0"/>
+              <a:t>Lessons Learned</a:t>
             </a:r>
-            <a:r>
-              <a:rPr lang="de-CH" dirty="0"/>
-              <a:t> </a:t>
-            </a:r>
-            <a:r>
-              <a:rPr lang="de-CH" dirty="0" err="1"/>
-              <a:t>Learned</a:t>
-            </a:r>
-            <a:endParaRPr lang="de-CH" dirty="0"/>
           </a:p>
         </p:txBody>
       </p:sp>
@@ -10168,10 +10136,9 @@
               </a:spcAft>
             </a:pPr>
             <a:r>
-              <a:rPr lang="de-DE"/>
+              <a:rPr lang="en-GB" noProof="0" dirty="0"/>
               <a:t>23 June 2025</a:t>
             </a:r>
-            <a:endParaRPr lang="de-CH"/>
           </a:p>
         </p:txBody>
       </p:sp>
@@ -10212,7 +10179,7 @@
               </a:spcAft>
             </a:pPr>
             <a:r>
-              <a:rPr lang="de-CH"/>
+              <a:rPr lang="en-GB" noProof="0" dirty="0"/>
               <a:t>Zumi7337 team presentation</a:t>
             </a:r>
           </a:p>
@@ -10255,7 +10222,7 @@
               </a:spcAft>
             </a:pPr>
             <a:fld id="{442AD375-037F-43D0-B059-5172DA06796A}" type="slidenum">
-              <a:rPr lang="de-CH" smtClean="0"/>
+              <a:rPr lang="en-GB" noProof="0" smtClean="0"/>
               <a:pPr>
                 <a:lnSpc>
                   <a:spcPct val="90000"/>
@@ -10266,7 +10233,7 @@
               </a:pPr>
               <a:t>4</a:t>
             </a:fld>
-            <a:endParaRPr lang="de-CH"/>
+            <a:endParaRPr lang="en-GB" noProof="0" dirty="0"/>
           </a:p>
         </p:txBody>
       </p:sp>
@@ -10286,7 +10253,7 @@
             <p:ph idx="1"/>
             <p:extLst>
               <p:ext uri="{D42A27DB-BD31-4B8C-83A1-F6EECF244321}">
-                <p14:modId xmlns:p14="http://schemas.microsoft.com/office/powerpoint/2010/main" val="569184105"/>
+                <p14:modId xmlns:p14="http://schemas.microsoft.com/office/powerpoint/2010/main" val="202255395"/>
               </p:ext>
             </p:extLst>
           </p:nvPr>
@@ -11456,9 +11423,12 @@
 </file>
 
 <file path=customXml/item1.xml><?xml version="1.0" encoding="utf-8"?>
-<p:properties xmlns:p="http://schemas.microsoft.com/office/2006/metadata/properties" xmlns:xsi="http://www.w3.org/2001/XMLSchema-instance" xmlns:pc="http://schemas.microsoft.com/office/infopath/2007/PartnerControls">
-  <documentManagement/>
-</p:properties>
+<?mso-contentType ?>
+<FormTemplates xmlns="http://schemas.microsoft.com/sharepoint/v3/contenttype/forms">
+  <Display>DocumentLibraryForm</Display>
+  <Edit>DocumentLibraryForm</Edit>
+  <New>DocumentLibraryForm</New>
+</FormTemplates>
 </file>
 
 <file path=customXml/item2.xml><?xml version="1.0" encoding="utf-8"?>
@@ -11606,27 +11576,15 @@
 </file>
 
 <file path=customXml/item3.xml><?xml version="1.0" encoding="utf-8"?>
-<?mso-contentType ?>
-<FormTemplates xmlns="http://schemas.microsoft.com/sharepoint/v3/contenttype/forms">
-  <Display>DocumentLibraryForm</Display>
-  <Edit>DocumentLibraryForm</Edit>
-  <New>DocumentLibraryForm</New>
-</FormTemplates>
+<p:properties xmlns:p="http://schemas.microsoft.com/office/2006/metadata/properties" xmlns:xsi="http://www.w3.org/2001/XMLSchema-instance" xmlns:pc="http://schemas.microsoft.com/office/infopath/2007/PartnerControls">
+  <documentManagement/>
+</p:properties>
 </file>
 
 <file path=customXml/itemProps1.xml><?xml version="1.0" encoding="utf-8"?>
-<ds:datastoreItem xmlns:ds="http://schemas.openxmlformats.org/officeDocument/2006/customXml" ds:itemID="{5626B806-0237-4942-A1FD-5C97285908C2}">
+<ds:datastoreItem xmlns:ds="http://schemas.openxmlformats.org/officeDocument/2006/customXml" ds:itemID="{4B6B7BE2-63AD-4C37-AC44-F0E4FC348E24}">
   <ds:schemaRefs>
-    <ds:schemaRef ds:uri="http://purl.org/dc/dcmitype/"/>
-    <ds:schemaRef ds:uri="http://schemas.openxmlformats.org/package/2006/metadata/core-properties"/>
-    <ds:schemaRef ds:uri="http://purl.org/dc/elements/1.1/"/>
-    <ds:schemaRef ds:uri="http://schemas.microsoft.com/office/2006/metadata/properties"/>
-    <ds:schemaRef ds:uri="c9077d15-72ed-4fec-bcfe-3472729e9195"/>
-    <ds:schemaRef ds:uri="http://schemas.microsoft.com/office/2006/documentManagement/types"/>
-    <ds:schemaRef ds:uri="http://purl.org/dc/terms/"/>
-    <ds:schemaRef ds:uri="http://schemas.microsoft.com/office/infopath/2007/PartnerControls"/>
-    <ds:schemaRef ds:uri="bc24777f-78b6-4f3c-a73a-d5fa08e4d537"/>
-    <ds:schemaRef ds:uri="http://www.w3.org/XML/1998/namespace"/>
+    <ds:schemaRef ds:uri="http://schemas.microsoft.com/sharepoint/v3/contenttype/forms"/>
   </ds:schemaRefs>
 </ds:datastoreItem>
 </file>
@@ -11650,9 +11608,18 @@
 </file>
 
 <file path=customXml/itemProps3.xml><?xml version="1.0" encoding="utf-8"?>
-<ds:datastoreItem xmlns:ds="http://schemas.openxmlformats.org/officeDocument/2006/customXml" ds:itemID="{4B6B7BE2-63AD-4C37-AC44-F0E4FC348E24}">
+<ds:datastoreItem xmlns:ds="http://schemas.openxmlformats.org/officeDocument/2006/customXml" ds:itemID="{5626B806-0237-4942-A1FD-5C97285908C2}">
   <ds:schemaRefs>
-    <ds:schemaRef ds:uri="http://schemas.microsoft.com/sharepoint/v3/contenttype/forms"/>
+    <ds:schemaRef ds:uri="http://purl.org/dc/dcmitype/"/>
+    <ds:schemaRef ds:uri="http://schemas.openxmlformats.org/package/2006/metadata/core-properties"/>
+    <ds:schemaRef ds:uri="http://purl.org/dc/elements/1.1/"/>
+    <ds:schemaRef ds:uri="http://schemas.microsoft.com/office/2006/metadata/properties"/>
+    <ds:schemaRef ds:uri="c9077d15-72ed-4fec-bcfe-3472729e9195"/>
+    <ds:schemaRef ds:uri="http://schemas.microsoft.com/office/2006/documentManagement/types"/>
+    <ds:schemaRef ds:uri="http://purl.org/dc/terms/"/>
+    <ds:schemaRef ds:uri="http://schemas.microsoft.com/office/infopath/2007/PartnerControls"/>
+    <ds:schemaRef ds:uri="bc24777f-78b6-4f3c-a73a-d5fa08e4d537"/>
+    <ds:schemaRef ds:uri="http://www.w3.org/XML/1998/namespace"/>
   </ds:schemaRefs>
 </ds:datastoreItem>
 </file>
</xml_diff>